<commit_message>
final update before classroom presentation
</commit_message>
<xml_diff>
--- a/presentations/Predicting solar storms_FINAL.pptx
+++ b/presentations/Predicting solar storms_FINAL.pptx
@@ -5,7 +5,7 @@
     <p:sldMasterId id="2147483648" r:id="rId1"/>
   </p:sldMasterIdLst>
   <p:notesMasterIdLst>
-    <p:notesMasterId r:id="rId11"/>
+    <p:notesMasterId r:id="rId14"/>
   </p:notesMasterIdLst>
   <p:sldIdLst>
     <p:sldId id="256" r:id="rId2"/>
@@ -17,6 +17,9 @@
     <p:sldId id="267" r:id="rId8"/>
     <p:sldId id="268" r:id="rId9"/>
     <p:sldId id="264" r:id="rId10"/>
+    <p:sldId id="269" r:id="rId11"/>
+    <p:sldId id="270" r:id="rId12"/>
+    <p:sldId id="271" r:id="rId13"/>
   </p:sldIdLst>
   <p:sldSz cx="12192000" cy="6858000"/>
   <p:notesSz cx="6858000" cy="9144000"/>
@@ -205,7 +208,7 @@
           <a:p>
             <a:fld id="{65252880-0C99-457C-A035-9BA09B268C80}" type="datetimeFigureOut">
               <a:rPr lang="en-US" smtClean="0"/>
-              <a:t>5/17/2016</a:t>
+              <a:t>5/18/2016</a:t>
             </a:fld>
             <a:endParaRPr lang="en-US"/>
           </a:p>
@@ -818,7 +821,7 @@
             <a:fld id="{B61BEF0D-F0BB-DE4B-95CE-6DB70DBA9567}" type="datetimeFigureOut">
               <a:rPr lang="en-US" dirty="0"/>
               <a:pPr/>
-              <a:t>5/17/2016</a:t>
+              <a:t>5/18/2016</a:t>
             </a:fld>
             <a:endParaRPr lang="en-US" dirty="0"/>
           </a:p>
@@ -1149,7 +1152,7 @@
             <a:fld id="{B61BEF0D-F0BB-DE4B-95CE-6DB70DBA9567}" type="datetimeFigureOut">
               <a:rPr lang="en-US" dirty="0"/>
               <a:pPr/>
-              <a:t>5/17/2016</a:t>
+              <a:t>5/18/2016</a:t>
             </a:fld>
             <a:endParaRPr lang="en-US" dirty="0"/>
           </a:p>
@@ -1424,7 +1427,7 @@
             <a:fld id="{B61BEF0D-F0BB-DE4B-95CE-6DB70DBA9567}" type="datetimeFigureOut">
               <a:rPr lang="en-US" dirty="0"/>
               <a:pPr/>
-              <a:t>5/17/2016</a:t>
+              <a:t>5/18/2016</a:t>
             </a:fld>
             <a:endParaRPr lang="en-US" dirty="0"/>
           </a:p>
@@ -1989,7 +1992,7 @@
             <a:fld id="{B61BEF0D-F0BB-DE4B-95CE-6DB70DBA9567}" type="datetimeFigureOut">
               <a:rPr lang="en-US" dirty="0"/>
               <a:pPr/>
-              <a:t>5/17/2016</a:t>
+              <a:t>5/18/2016</a:t>
             </a:fld>
             <a:endParaRPr lang="en-US" dirty="0"/>
           </a:p>
@@ -2264,7 +2267,7 @@
             <a:fld id="{B61BEF0D-F0BB-DE4B-95CE-6DB70DBA9567}" type="datetimeFigureOut">
               <a:rPr lang="en-US" dirty="0"/>
               <a:pPr/>
-              <a:t>5/17/2016</a:t>
+              <a:t>5/18/2016</a:t>
             </a:fld>
             <a:endParaRPr lang="en-US" dirty="0"/>
           </a:p>
@@ -2823,7 +2826,7 @@
             <a:fld id="{B61BEF0D-F0BB-DE4B-95CE-6DB70DBA9567}" type="datetimeFigureOut">
               <a:rPr lang="en-US" dirty="0"/>
               <a:pPr/>
-              <a:t>5/17/2016</a:t>
+              <a:t>5/18/2016</a:t>
             </a:fld>
             <a:endParaRPr lang="en-US" dirty="0"/>
           </a:p>
@@ -3147,7 +3150,7 @@
             <a:fld id="{B61BEF0D-F0BB-DE4B-95CE-6DB70DBA9567}" type="datetimeFigureOut">
               <a:rPr lang="en-US" dirty="0"/>
               <a:pPr/>
-              <a:t>5/17/2016</a:t>
+              <a:t>5/18/2016</a:t>
             </a:fld>
             <a:endParaRPr lang="en-US" dirty="0"/>
           </a:p>
@@ -3349,7 +3352,7 @@
             <a:fld id="{B61BEF0D-F0BB-DE4B-95CE-6DB70DBA9567}" type="datetimeFigureOut">
               <a:rPr lang="en-US" dirty="0"/>
               <a:pPr/>
-              <a:t>5/17/2016</a:t>
+              <a:t>5/18/2016</a:t>
             </a:fld>
             <a:endParaRPr lang="en-US" dirty="0"/>
           </a:p>
@@ -3556,7 +3559,7 @@
             <a:fld id="{B61BEF0D-F0BB-DE4B-95CE-6DB70DBA9567}" type="datetimeFigureOut">
               <a:rPr lang="en-US" dirty="0"/>
               <a:pPr/>
-              <a:t>5/17/2016</a:t>
+              <a:t>5/18/2016</a:t>
             </a:fld>
             <a:endParaRPr lang="en-US" dirty="0"/>
           </a:p>
@@ -3753,7 +3756,7 @@
             <a:fld id="{B61BEF0D-F0BB-DE4B-95CE-6DB70DBA9567}" type="datetimeFigureOut">
               <a:rPr lang="en-US" dirty="0"/>
               <a:pPr/>
-              <a:t>5/17/2016</a:t>
+              <a:t>5/18/2016</a:t>
             </a:fld>
             <a:endParaRPr lang="en-US" dirty="0"/>
           </a:p>
@@ -4026,7 +4029,7 @@
             <a:fld id="{B61BEF0D-F0BB-DE4B-95CE-6DB70DBA9567}" type="datetimeFigureOut">
               <a:rPr lang="en-US" dirty="0"/>
               <a:pPr/>
-              <a:t>5/17/2016</a:t>
+              <a:t>5/18/2016</a:t>
             </a:fld>
             <a:endParaRPr lang="en-US" dirty="0"/>
           </a:p>
@@ -4289,7 +4292,7 @@
             <a:fld id="{B61BEF0D-F0BB-DE4B-95CE-6DB70DBA9567}" type="datetimeFigureOut">
               <a:rPr lang="en-US" dirty="0"/>
               <a:pPr/>
-              <a:t>5/17/2016</a:t>
+              <a:t>5/18/2016</a:t>
             </a:fld>
             <a:endParaRPr lang="en-US" dirty="0"/>
           </a:p>
@@ -4660,7 +4663,7 @@
             <a:fld id="{B61BEF0D-F0BB-DE4B-95CE-6DB70DBA9567}" type="datetimeFigureOut">
               <a:rPr lang="en-US" dirty="0"/>
               <a:pPr/>
-              <a:t>5/17/2016</a:t>
+              <a:t>5/18/2016</a:t>
             </a:fld>
             <a:endParaRPr lang="en-US" dirty="0"/>
           </a:p>
@@ -4805,7 +4808,7 @@
             <a:fld id="{B61BEF0D-F0BB-DE4B-95CE-6DB70DBA9567}" type="datetimeFigureOut">
               <a:rPr lang="en-US" dirty="0"/>
               <a:pPr/>
-              <a:t>5/17/2016</a:t>
+              <a:t>5/18/2016</a:t>
             </a:fld>
             <a:endParaRPr lang="en-US" dirty="0"/>
           </a:p>
@@ -4927,7 +4930,7 @@
             <a:fld id="{B61BEF0D-F0BB-DE4B-95CE-6DB70DBA9567}" type="datetimeFigureOut">
               <a:rPr lang="en-US" dirty="0"/>
               <a:pPr/>
-              <a:t>5/17/2016</a:t>
+              <a:t>5/18/2016</a:t>
             </a:fld>
             <a:endParaRPr lang="en-US" dirty="0"/>
           </a:p>
@@ -5209,7 +5212,7 @@
             <a:fld id="{B61BEF0D-F0BB-DE4B-95CE-6DB70DBA9567}" type="datetimeFigureOut">
               <a:rPr lang="en-US" dirty="0"/>
               <a:pPr/>
-              <a:t>5/17/2016</a:t>
+              <a:t>5/18/2016</a:t>
             </a:fld>
             <a:endParaRPr lang="en-US" dirty="0"/>
           </a:p>
@@ -5530,7 +5533,7 @@
             <a:fld id="{B61BEF0D-F0BB-DE4B-95CE-6DB70DBA9567}" type="datetimeFigureOut">
               <a:rPr lang="en-US" dirty="0"/>
               <a:pPr/>
-              <a:t>5/17/2016</a:t>
+              <a:t>5/18/2016</a:t>
             </a:fld>
             <a:endParaRPr lang="en-US" dirty="0"/>
           </a:p>
@@ -5741,7 +5744,7 @@
             <a:fld id="{B61BEF0D-F0BB-DE4B-95CE-6DB70DBA9567}" type="datetimeFigureOut">
               <a:rPr lang="en-US" dirty="0"/>
               <a:pPr/>
-              <a:t>5/17/2016</a:t>
+              <a:t>5/18/2016</a:t>
             </a:fld>
             <a:endParaRPr lang="en-US" dirty="0"/>
           </a:p>
@@ -6337,6 +6340,1227 @@
 </p:sld>
 </file>
 
+<file path=ppt/slides/slide10.xml><?xml version="1.0" encoding="utf-8"?>
+<p:sld xmlns:a="http://schemas.openxmlformats.org/drawingml/2006/main" xmlns:r="http://schemas.openxmlformats.org/officeDocument/2006/relationships" xmlns:p="http://schemas.openxmlformats.org/presentationml/2006/main">
+  <p:cSld>
+    <p:spTree>
+      <p:nvGrpSpPr>
+        <p:cNvPr id="1" name=""/>
+        <p:cNvGrpSpPr/>
+        <p:nvPr/>
+      </p:nvGrpSpPr>
+      <p:grpSpPr>
+        <a:xfrm>
+          <a:off x="0" y="0"/>
+          <a:ext cx="0" cy="0"/>
+          <a:chOff x="0" y="0"/>
+          <a:chExt cx="0" cy="0"/>
+        </a:xfrm>
+      </p:grpSpPr>
+      <p:sp>
+        <p:nvSpPr>
+          <p:cNvPr id="2" name="Title 1"/>
+          <p:cNvSpPr>
+            <a:spLocks noGrp="1"/>
+          </p:cNvSpPr>
+          <p:nvPr>
+            <p:ph type="title"/>
+          </p:nvPr>
+        </p:nvSpPr>
+        <p:spPr/>
+        <p:txBody>
+          <a:bodyPr/>
+          <a:lstStyle/>
+          <a:p>
+            <a:r>
+              <a:rPr lang="en-US" dirty="0" smtClean="0"/>
+              <a:t>CURRENT PROGRESS AGAINST GOALS</a:t>
+            </a:r>
+            <a:endParaRPr lang="en-US" dirty="0"/>
+          </a:p>
+        </p:txBody>
+      </p:sp>
+      <p:sp>
+        <p:nvSpPr>
+          <p:cNvPr id="3" name="Content Placeholder 2"/>
+          <p:cNvSpPr>
+            <a:spLocks noGrp="1"/>
+          </p:cNvSpPr>
+          <p:nvPr>
+            <p:ph idx="1"/>
+          </p:nvPr>
+        </p:nvSpPr>
+        <p:spPr>
+          <a:xfrm>
+            <a:off x="1647090" y="2142067"/>
+            <a:ext cx="10131425" cy="3649133"/>
+          </a:xfrm>
+        </p:spPr>
+        <p:txBody>
+          <a:bodyPr/>
+          <a:lstStyle/>
+          <a:p>
+            <a:pPr marL="342900" indent="-342900">
+              <a:buFont typeface="+mj-lt"/>
+              <a:buAutoNum type="arabicPeriod"/>
+            </a:pPr>
+            <a:r>
+              <a:rPr lang="en-US" sz="2800" dirty="0"/>
+              <a:t>B</a:t>
+            </a:r>
+            <a:r>
+              <a:rPr lang="en-US" sz="2800" dirty="0" smtClean="0"/>
+              <a:t>uild </a:t>
+            </a:r>
+            <a:r>
+              <a:rPr lang="en-US" sz="2800" dirty="0"/>
+              <a:t>a predictive model to estimate </a:t>
+            </a:r>
+            <a:r>
+              <a:rPr lang="en-US" sz="2800" dirty="0" smtClean="0"/>
+              <a:t>the geomagnetic activity on Earth in response to solar storms</a:t>
+            </a:r>
+            <a:endParaRPr lang="en-US" sz="2800" dirty="0"/>
+          </a:p>
+          <a:p>
+            <a:pPr marL="342900" indent="-342900">
+              <a:buFont typeface="+mj-lt"/>
+              <a:buAutoNum type="arabicPeriod"/>
+            </a:pPr>
+            <a:r>
+              <a:rPr lang="en-US" sz="2800" dirty="0"/>
+              <a:t>Identify the factors on the Sun that result </a:t>
+            </a:r>
+            <a:r>
+              <a:rPr lang="en-US" sz="2800" dirty="0" smtClean="0"/>
+              <a:t>in high levels of </a:t>
+            </a:r>
+            <a:r>
+              <a:rPr lang="en-US" sz="2800" dirty="0"/>
+              <a:t>geomagnetic activity on the Earth</a:t>
+            </a:r>
+          </a:p>
+          <a:p>
+            <a:pPr marL="342900" indent="-342900">
+              <a:buFont typeface="+mj-lt"/>
+              <a:buAutoNum type="arabicPeriod"/>
+            </a:pPr>
+            <a:r>
+              <a:rPr lang="en-US" sz="2800" dirty="0"/>
+              <a:t>Identify patterns on the Sun that can help predict </a:t>
+            </a:r>
+            <a:r>
+              <a:rPr lang="en-US" sz="2800" dirty="0" smtClean="0"/>
+              <a:t>Carrington-class Events</a:t>
+            </a:r>
+            <a:r>
+              <a:rPr lang="en-US" sz="2800" dirty="0"/>
+              <a:t>.</a:t>
+            </a:r>
+          </a:p>
+          <a:p>
+            <a:endParaRPr lang="en-US" dirty="0"/>
+          </a:p>
+        </p:txBody>
+      </p:sp>
+      <p:grpSp>
+        <p:nvGrpSpPr>
+          <p:cNvPr id="4" name="Group 3"/>
+          <p:cNvGrpSpPr>
+            <a:grpSpLocks noChangeAspect="1"/>
+          </p:cNvGrpSpPr>
+          <p:nvPr/>
+        </p:nvGrpSpPr>
+        <p:grpSpPr>
+          <a:xfrm rot="10800000">
+            <a:off x="778917" y="2397370"/>
+            <a:ext cx="597877" cy="597877"/>
+            <a:chOff x="5985387" y="3048000"/>
+            <a:chExt cx="914400" cy="914400"/>
+          </a:xfrm>
+        </p:grpSpPr>
+        <p:sp>
+          <p:nvSpPr>
+            <p:cNvPr id="5" name="Oval 4"/>
+            <p:cNvSpPr>
+              <a:spLocks noChangeAspect="1"/>
+            </p:cNvSpPr>
+            <p:nvPr/>
+          </p:nvSpPr>
+          <p:spPr>
+            <a:xfrm>
+              <a:off x="5985387" y="3048000"/>
+              <a:ext cx="914400" cy="914400"/>
+            </a:xfrm>
+            <a:prstGeom prst="ellipse">
+              <a:avLst/>
+            </a:prstGeom>
+            <a:noFill/>
+            <a:ln w="19050">
+              <a:solidFill>
+                <a:schemeClr val="tx1"/>
+              </a:solidFill>
+            </a:ln>
+          </p:spPr>
+          <p:style>
+            <a:lnRef idx="2">
+              <a:schemeClr val="accent1">
+                <a:shade val="50000"/>
+              </a:schemeClr>
+            </a:lnRef>
+            <a:fillRef idx="1">
+              <a:schemeClr val="accent1"/>
+            </a:fillRef>
+            <a:effectRef idx="0">
+              <a:schemeClr val="accent1"/>
+            </a:effectRef>
+            <a:fontRef idx="minor">
+              <a:schemeClr val="lt1"/>
+            </a:fontRef>
+          </p:style>
+          <p:txBody>
+            <a:bodyPr rtlCol="0" anchor="ctr"/>
+            <a:lstStyle>
+              <a:defPPr>
+                <a:defRPr lang="en-US"/>
+              </a:defPPr>
+              <a:lvl1pPr marL="0" algn="l" defTabSz="914400" rtl="0" eaLnBrk="1" latinLnBrk="0" hangingPunct="1">
+                <a:defRPr sz="1800" kern="1200">
+                  <a:solidFill>
+                    <a:schemeClr val="lt1"/>
+                  </a:solidFill>
+                  <a:latin typeface="+mn-lt"/>
+                  <a:ea typeface="+mn-ea"/>
+                  <a:cs typeface="+mn-cs"/>
+                </a:defRPr>
+              </a:lvl1pPr>
+              <a:lvl2pPr marL="457200" algn="l" defTabSz="914400" rtl="0" eaLnBrk="1" latinLnBrk="0" hangingPunct="1">
+                <a:defRPr sz="1800" kern="1200">
+                  <a:solidFill>
+                    <a:schemeClr val="lt1"/>
+                  </a:solidFill>
+                  <a:latin typeface="+mn-lt"/>
+                  <a:ea typeface="+mn-ea"/>
+                  <a:cs typeface="+mn-cs"/>
+                </a:defRPr>
+              </a:lvl2pPr>
+              <a:lvl3pPr marL="914400" algn="l" defTabSz="914400" rtl="0" eaLnBrk="1" latinLnBrk="0" hangingPunct="1">
+                <a:defRPr sz="1800" kern="1200">
+                  <a:solidFill>
+                    <a:schemeClr val="lt1"/>
+                  </a:solidFill>
+                  <a:latin typeface="+mn-lt"/>
+                  <a:ea typeface="+mn-ea"/>
+                  <a:cs typeface="+mn-cs"/>
+                </a:defRPr>
+              </a:lvl3pPr>
+              <a:lvl4pPr marL="1371600" algn="l" defTabSz="914400" rtl="0" eaLnBrk="1" latinLnBrk="0" hangingPunct="1">
+                <a:defRPr sz="1800" kern="1200">
+                  <a:solidFill>
+                    <a:schemeClr val="lt1"/>
+                  </a:solidFill>
+                  <a:latin typeface="+mn-lt"/>
+                  <a:ea typeface="+mn-ea"/>
+                  <a:cs typeface="+mn-cs"/>
+                </a:defRPr>
+              </a:lvl4pPr>
+              <a:lvl5pPr marL="1828800" algn="l" defTabSz="914400" rtl="0" eaLnBrk="1" latinLnBrk="0" hangingPunct="1">
+                <a:defRPr sz="1800" kern="1200">
+                  <a:solidFill>
+                    <a:schemeClr val="lt1"/>
+                  </a:solidFill>
+                  <a:latin typeface="+mn-lt"/>
+                  <a:ea typeface="+mn-ea"/>
+                  <a:cs typeface="+mn-cs"/>
+                </a:defRPr>
+              </a:lvl5pPr>
+              <a:lvl6pPr marL="2286000" algn="l" defTabSz="914400" rtl="0" eaLnBrk="1" latinLnBrk="0" hangingPunct="1">
+                <a:defRPr sz="1800" kern="1200">
+                  <a:solidFill>
+                    <a:schemeClr val="lt1"/>
+                  </a:solidFill>
+                  <a:latin typeface="+mn-lt"/>
+                  <a:ea typeface="+mn-ea"/>
+                  <a:cs typeface="+mn-cs"/>
+                </a:defRPr>
+              </a:lvl6pPr>
+              <a:lvl7pPr marL="2743200" algn="l" defTabSz="914400" rtl="0" eaLnBrk="1" latinLnBrk="0" hangingPunct="1">
+                <a:defRPr sz="1800" kern="1200">
+                  <a:solidFill>
+                    <a:schemeClr val="lt1"/>
+                  </a:solidFill>
+                  <a:latin typeface="+mn-lt"/>
+                  <a:ea typeface="+mn-ea"/>
+                  <a:cs typeface="+mn-cs"/>
+                </a:defRPr>
+              </a:lvl7pPr>
+              <a:lvl8pPr marL="3200400" algn="l" defTabSz="914400" rtl="0" eaLnBrk="1" latinLnBrk="0" hangingPunct="1">
+                <a:defRPr sz="1800" kern="1200">
+                  <a:solidFill>
+                    <a:schemeClr val="lt1"/>
+                  </a:solidFill>
+                  <a:latin typeface="+mn-lt"/>
+                  <a:ea typeface="+mn-ea"/>
+                  <a:cs typeface="+mn-cs"/>
+                </a:defRPr>
+              </a:lvl8pPr>
+              <a:lvl9pPr marL="3657600" algn="l" defTabSz="914400" rtl="0" eaLnBrk="1" latinLnBrk="0" hangingPunct="1">
+                <a:defRPr sz="1800" kern="1200">
+                  <a:solidFill>
+                    <a:schemeClr val="lt1"/>
+                  </a:solidFill>
+                  <a:latin typeface="+mn-lt"/>
+                  <a:ea typeface="+mn-ea"/>
+                  <a:cs typeface="+mn-cs"/>
+                </a:defRPr>
+              </a:lvl9pPr>
+            </a:lstStyle>
+            <a:p>
+              <a:pPr algn="ctr"/>
+              <a:endParaRPr lang="en-US"/>
+            </a:p>
+          </p:txBody>
+        </p:sp>
+        <p:sp>
+          <p:nvSpPr>
+            <p:cNvPr id="6" name="Oval 10"/>
+            <p:cNvSpPr>
+              <a:spLocks noChangeAspect="1"/>
+            </p:cNvSpPr>
+            <p:nvPr/>
+          </p:nvSpPr>
+          <p:spPr>
+            <a:xfrm>
+              <a:off x="5985387" y="3048000"/>
+              <a:ext cx="457200" cy="914400"/>
+            </a:xfrm>
+            <a:custGeom>
+              <a:avLst/>
+              <a:gdLst/>
+              <a:ahLst/>
+              <a:cxnLst/>
+              <a:rect l="l" t="t" r="r" b="b"/>
+              <a:pathLst>
+                <a:path w="457200" h="914400">
+                  <a:moveTo>
+                    <a:pt x="457200" y="0"/>
+                  </a:moveTo>
+                  <a:lnTo>
+                    <a:pt x="457200" y="914400"/>
+                  </a:lnTo>
+                  <a:cubicBezTo>
+                    <a:pt x="204695" y="914400"/>
+                    <a:pt x="0" y="709705"/>
+                    <a:pt x="0" y="457200"/>
+                  </a:cubicBezTo>
+                  <a:cubicBezTo>
+                    <a:pt x="0" y="204695"/>
+                    <a:pt x="204695" y="0"/>
+                    <a:pt x="457200" y="0"/>
+                  </a:cubicBezTo>
+                  <a:close/>
+                </a:path>
+              </a:pathLst>
+            </a:custGeom>
+            <a:solidFill>
+              <a:schemeClr val="bg1"/>
+            </a:solidFill>
+            <a:ln>
+              <a:noFill/>
+            </a:ln>
+          </p:spPr>
+          <p:style>
+            <a:lnRef idx="2">
+              <a:schemeClr val="accent1">
+                <a:shade val="50000"/>
+              </a:schemeClr>
+            </a:lnRef>
+            <a:fillRef idx="1">
+              <a:schemeClr val="accent1"/>
+            </a:fillRef>
+            <a:effectRef idx="0">
+              <a:schemeClr val="accent1"/>
+            </a:effectRef>
+            <a:fontRef idx="minor">
+              <a:schemeClr val="lt1"/>
+            </a:fontRef>
+          </p:style>
+          <p:txBody>
+            <a:bodyPr rtlCol="0" anchor="ctr"/>
+            <a:lstStyle>
+              <a:defPPr>
+                <a:defRPr lang="en-US"/>
+              </a:defPPr>
+              <a:lvl1pPr marL="0" algn="l" defTabSz="914400" rtl="0" eaLnBrk="1" latinLnBrk="0" hangingPunct="1">
+                <a:defRPr sz="1800" kern="1200">
+                  <a:solidFill>
+                    <a:schemeClr val="lt1"/>
+                  </a:solidFill>
+                  <a:latin typeface="+mn-lt"/>
+                  <a:ea typeface="+mn-ea"/>
+                  <a:cs typeface="+mn-cs"/>
+                </a:defRPr>
+              </a:lvl1pPr>
+              <a:lvl2pPr marL="457200" algn="l" defTabSz="914400" rtl="0" eaLnBrk="1" latinLnBrk="0" hangingPunct="1">
+                <a:defRPr sz="1800" kern="1200">
+                  <a:solidFill>
+                    <a:schemeClr val="lt1"/>
+                  </a:solidFill>
+                  <a:latin typeface="+mn-lt"/>
+                  <a:ea typeface="+mn-ea"/>
+                  <a:cs typeface="+mn-cs"/>
+                </a:defRPr>
+              </a:lvl2pPr>
+              <a:lvl3pPr marL="914400" algn="l" defTabSz="914400" rtl="0" eaLnBrk="1" latinLnBrk="0" hangingPunct="1">
+                <a:defRPr sz="1800" kern="1200">
+                  <a:solidFill>
+                    <a:schemeClr val="lt1"/>
+                  </a:solidFill>
+                  <a:latin typeface="+mn-lt"/>
+                  <a:ea typeface="+mn-ea"/>
+                  <a:cs typeface="+mn-cs"/>
+                </a:defRPr>
+              </a:lvl3pPr>
+              <a:lvl4pPr marL="1371600" algn="l" defTabSz="914400" rtl="0" eaLnBrk="1" latinLnBrk="0" hangingPunct="1">
+                <a:defRPr sz="1800" kern="1200">
+                  <a:solidFill>
+                    <a:schemeClr val="lt1"/>
+                  </a:solidFill>
+                  <a:latin typeface="+mn-lt"/>
+                  <a:ea typeface="+mn-ea"/>
+                  <a:cs typeface="+mn-cs"/>
+                </a:defRPr>
+              </a:lvl4pPr>
+              <a:lvl5pPr marL="1828800" algn="l" defTabSz="914400" rtl="0" eaLnBrk="1" latinLnBrk="0" hangingPunct="1">
+                <a:defRPr sz="1800" kern="1200">
+                  <a:solidFill>
+                    <a:schemeClr val="lt1"/>
+                  </a:solidFill>
+                  <a:latin typeface="+mn-lt"/>
+                  <a:ea typeface="+mn-ea"/>
+                  <a:cs typeface="+mn-cs"/>
+                </a:defRPr>
+              </a:lvl5pPr>
+              <a:lvl6pPr marL="2286000" algn="l" defTabSz="914400" rtl="0" eaLnBrk="1" latinLnBrk="0" hangingPunct="1">
+                <a:defRPr sz="1800" kern="1200">
+                  <a:solidFill>
+                    <a:schemeClr val="lt1"/>
+                  </a:solidFill>
+                  <a:latin typeface="+mn-lt"/>
+                  <a:ea typeface="+mn-ea"/>
+                  <a:cs typeface="+mn-cs"/>
+                </a:defRPr>
+              </a:lvl6pPr>
+              <a:lvl7pPr marL="2743200" algn="l" defTabSz="914400" rtl="0" eaLnBrk="1" latinLnBrk="0" hangingPunct="1">
+                <a:defRPr sz="1800" kern="1200">
+                  <a:solidFill>
+                    <a:schemeClr val="lt1"/>
+                  </a:solidFill>
+                  <a:latin typeface="+mn-lt"/>
+                  <a:ea typeface="+mn-ea"/>
+                  <a:cs typeface="+mn-cs"/>
+                </a:defRPr>
+              </a:lvl7pPr>
+              <a:lvl8pPr marL="3200400" algn="l" defTabSz="914400" rtl="0" eaLnBrk="1" latinLnBrk="0" hangingPunct="1">
+                <a:defRPr sz="1800" kern="1200">
+                  <a:solidFill>
+                    <a:schemeClr val="lt1"/>
+                  </a:solidFill>
+                  <a:latin typeface="+mn-lt"/>
+                  <a:ea typeface="+mn-ea"/>
+                  <a:cs typeface="+mn-cs"/>
+                </a:defRPr>
+              </a:lvl8pPr>
+              <a:lvl9pPr marL="3657600" algn="l" defTabSz="914400" rtl="0" eaLnBrk="1" latinLnBrk="0" hangingPunct="1">
+                <a:defRPr sz="1800" kern="1200">
+                  <a:solidFill>
+                    <a:schemeClr val="lt1"/>
+                  </a:solidFill>
+                  <a:latin typeface="+mn-lt"/>
+                  <a:ea typeface="+mn-ea"/>
+                  <a:cs typeface="+mn-cs"/>
+                </a:defRPr>
+              </a:lvl9pPr>
+            </a:lstStyle>
+            <a:p>
+              <a:pPr algn="ctr"/>
+              <a:endParaRPr lang="en-US"/>
+            </a:p>
+          </p:txBody>
+        </p:sp>
+      </p:grpSp>
+      <p:sp>
+        <p:nvSpPr>
+          <p:cNvPr id="8" name="Oval 7"/>
+          <p:cNvSpPr>
+            <a:spLocks noChangeAspect="1"/>
+          </p:cNvSpPr>
+          <p:nvPr/>
+        </p:nvSpPr>
+        <p:spPr>
+          <a:xfrm rot="10800000">
+            <a:off x="798096" y="4282182"/>
+            <a:ext cx="597878" cy="597878"/>
+          </a:xfrm>
+          <a:prstGeom prst="ellipse">
+            <a:avLst/>
+          </a:prstGeom>
+          <a:noFill/>
+          <a:ln w="19050">
+            <a:solidFill>
+              <a:schemeClr val="tx1"/>
+            </a:solidFill>
+          </a:ln>
+        </p:spPr>
+        <p:style>
+          <a:lnRef idx="2">
+            <a:schemeClr val="accent1">
+              <a:shade val="50000"/>
+            </a:schemeClr>
+          </a:lnRef>
+          <a:fillRef idx="1">
+            <a:schemeClr val="accent1"/>
+          </a:fillRef>
+          <a:effectRef idx="0">
+            <a:schemeClr val="accent1"/>
+          </a:effectRef>
+          <a:fontRef idx="minor">
+            <a:schemeClr val="lt1"/>
+          </a:fontRef>
+        </p:style>
+        <p:txBody>
+          <a:bodyPr rtlCol="0" anchor="ctr"/>
+          <a:lstStyle>
+            <a:defPPr>
+              <a:defRPr lang="en-US"/>
+            </a:defPPr>
+            <a:lvl1pPr marL="0" algn="l" defTabSz="914400" rtl="0" eaLnBrk="1" latinLnBrk="0" hangingPunct="1">
+              <a:defRPr sz="1800" kern="1200">
+                <a:solidFill>
+                  <a:schemeClr val="lt1"/>
+                </a:solidFill>
+                <a:latin typeface="+mn-lt"/>
+                <a:ea typeface="+mn-ea"/>
+                <a:cs typeface="+mn-cs"/>
+              </a:defRPr>
+            </a:lvl1pPr>
+            <a:lvl2pPr marL="457200" algn="l" defTabSz="914400" rtl="0" eaLnBrk="1" latinLnBrk="0" hangingPunct="1">
+              <a:defRPr sz="1800" kern="1200">
+                <a:solidFill>
+                  <a:schemeClr val="lt1"/>
+                </a:solidFill>
+                <a:latin typeface="+mn-lt"/>
+                <a:ea typeface="+mn-ea"/>
+                <a:cs typeface="+mn-cs"/>
+              </a:defRPr>
+            </a:lvl2pPr>
+            <a:lvl3pPr marL="914400" algn="l" defTabSz="914400" rtl="0" eaLnBrk="1" latinLnBrk="0" hangingPunct="1">
+              <a:defRPr sz="1800" kern="1200">
+                <a:solidFill>
+                  <a:schemeClr val="lt1"/>
+                </a:solidFill>
+                <a:latin typeface="+mn-lt"/>
+                <a:ea typeface="+mn-ea"/>
+                <a:cs typeface="+mn-cs"/>
+              </a:defRPr>
+            </a:lvl3pPr>
+            <a:lvl4pPr marL="1371600" algn="l" defTabSz="914400" rtl="0" eaLnBrk="1" latinLnBrk="0" hangingPunct="1">
+              <a:defRPr sz="1800" kern="1200">
+                <a:solidFill>
+                  <a:schemeClr val="lt1"/>
+                </a:solidFill>
+                <a:latin typeface="+mn-lt"/>
+                <a:ea typeface="+mn-ea"/>
+                <a:cs typeface="+mn-cs"/>
+              </a:defRPr>
+            </a:lvl4pPr>
+            <a:lvl5pPr marL="1828800" algn="l" defTabSz="914400" rtl="0" eaLnBrk="1" latinLnBrk="0" hangingPunct="1">
+              <a:defRPr sz="1800" kern="1200">
+                <a:solidFill>
+                  <a:schemeClr val="lt1"/>
+                </a:solidFill>
+                <a:latin typeface="+mn-lt"/>
+                <a:ea typeface="+mn-ea"/>
+                <a:cs typeface="+mn-cs"/>
+              </a:defRPr>
+            </a:lvl5pPr>
+            <a:lvl6pPr marL="2286000" algn="l" defTabSz="914400" rtl="0" eaLnBrk="1" latinLnBrk="0" hangingPunct="1">
+              <a:defRPr sz="1800" kern="1200">
+                <a:solidFill>
+                  <a:schemeClr val="lt1"/>
+                </a:solidFill>
+                <a:latin typeface="+mn-lt"/>
+                <a:ea typeface="+mn-ea"/>
+                <a:cs typeface="+mn-cs"/>
+              </a:defRPr>
+            </a:lvl6pPr>
+            <a:lvl7pPr marL="2743200" algn="l" defTabSz="914400" rtl="0" eaLnBrk="1" latinLnBrk="0" hangingPunct="1">
+              <a:defRPr sz="1800" kern="1200">
+                <a:solidFill>
+                  <a:schemeClr val="lt1"/>
+                </a:solidFill>
+                <a:latin typeface="+mn-lt"/>
+                <a:ea typeface="+mn-ea"/>
+                <a:cs typeface="+mn-cs"/>
+              </a:defRPr>
+            </a:lvl7pPr>
+            <a:lvl8pPr marL="3200400" algn="l" defTabSz="914400" rtl="0" eaLnBrk="1" latinLnBrk="0" hangingPunct="1">
+              <a:defRPr sz="1800" kern="1200">
+                <a:solidFill>
+                  <a:schemeClr val="lt1"/>
+                </a:solidFill>
+                <a:latin typeface="+mn-lt"/>
+                <a:ea typeface="+mn-ea"/>
+                <a:cs typeface="+mn-cs"/>
+              </a:defRPr>
+            </a:lvl8pPr>
+            <a:lvl9pPr marL="3657600" algn="l" defTabSz="914400" rtl="0" eaLnBrk="1" latinLnBrk="0" hangingPunct="1">
+              <a:defRPr sz="1800" kern="1200">
+                <a:solidFill>
+                  <a:schemeClr val="lt1"/>
+                </a:solidFill>
+                <a:latin typeface="+mn-lt"/>
+                <a:ea typeface="+mn-ea"/>
+                <a:cs typeface="+mn-cs"/>
+              </a:defRPr>
+            </a:lvl9pPr>
+          </a:lstStyle>
+          <a:p>
+            <a:pPr algn="ctr"/>
+            <a:endParaRPr lang="en-US"/>
+          </a:p>
+        </p:txBody>
+      </p:sp>
+      <p:grpSp>
+        <p:nvGrpSpPr>
+          <p:cNvPr id="10" name="Group 9"/>
+          <p:cNvGrpSpPr>
+            <a:grpSpLocks noChangeAspect="1"/>
+          </p:cNvGrpSpPr>
+          <p:nvPr/>
+        </p:nvGrpSpPr>
+        <p:grpSpPr>
+          <a:xfrm rot="5400000">
+            <a:off x="778916" y="3343039"/>
+            <a:ext cx="591350" cy="591350"/>
+            <a:chOff x="5985387" y="4419600"/>
+            <a:chExt cx="914400" cy="914400"/>
+          </a:xfrm>
+        </p:grpSpPr>
+        <p:sp>
+          <p:nvSpPr>
+            <p:cNvPr id="11" name="Oval 10"/>
+            <p:cNvSpPr>
+              <a:spLocks noChangeAspect="1"/>
+            </p:cNvSpPr>
+            <p:nvPr/>
+          </p:nvSpPr>
+          <p:spPr>
+            <a:xfrm>
+              <a:off x="5985387" y="4419600"/>
+              <a:ext cx="914400" cy="914400"/>
+            </a:xfrm>
+            <a:prstGeom prst="ellipse">
+              <a:avLst/>
+            </a:prstGeom>
+            <a:noFill/>
+            <a:ln w="19050">
+              <a:solidFill>
+                <a:schemeClr val="tx1"/>
+              </a:solidFill>
+            </a:ln>
+          </p:spPr>
+          <p:style>
+            <a:lnRef idx="2">
+              <a:schemeClr val="accent1">
+                <a:shade val="50000"/>
+              </a:schemeClr>
+            </a:lnRef>
+            <a:fillRef idx="1">
+              <a:schemeClr val="accent1"/>
+            </a:fillRef>
+            <a:effectRef idx="0">
+              <a:schemeClr val="accent1"/>
+            </a:effectRef>
+            <a:fontRef idx="minor">
+              <a:schemeClr val="lt1"/>
+            </a:fontRef>
+          </p:style>
+          <p:txBody>
+            <a:bodyPr rtlCol="0" anchor="ctr"/>
+            <a:lstStyle/>
+            <a:p>
+              <a:pPr algn="ctr"/>
+              <a:endParaRPr lang="en-US"/>
+            </a:p>
+          </p:txBody>
+        </p:sp>
+        <p:sp>
+          <p:nvSpPr>
+            <p:cNvPr id="12" name="Oval 10"/>
+            <p:cNvSpPr>
+              <a:spLocks noChangeAspect="1"/>
+            </p:cNvSpPr>
+            <p:nvPr/>
+          </p:nvSpPr>
+          <p:spPr>
+            <a:xfrm>
+              <a:off x="5985387" y="4419600"/>
+              <a:ext cx="457200" cy="457200"/>
+            </a:xfrm>
+            <a:custGeom>
+              <a:avLst/>
+              <a:gdLst/>
+              <a:ahLst/>
+              <a:cxnLst/>
+              <a:rect l="l" t="t" r="r" b="b"/>
+              <a:pathLst>
+                <a:path w="457200" h="457200">
+                  <a:moveTo>
+                    <a:pt x="457200" y="0"/>
+                  </a:moveTo>
+                  <a:lnTo>
+                    <a:pt x="457200" y="457200"/>
+                  </a:lnTo>
+                  <a:lnTo>
+                    <a:pt x="0" y="457200"/>
+                  </a:lnTo>
+                  <a:cubicBezTo>
+                    <a:pt x="0" y="204695"/>
+                    <a:pt x="204695" y="0"/>
+                    <a:pt x="457200" y="0"/>
+                  </a:cubicBezTo>
+                  <a:close/>
+                </a:path>
+              </a:pathLst>
+            </a:custGeom>
+            <a:solidFill>
+              <a:schemeClr val="bg1"/>
+            </a:solidFill>
+            <a:ln>
+              <a:noFill/>
+            </a:ln>
+          </p:spPr>
+          <p:style>
+            <a:lnRef idx="2">
+              <a:schemeClr val="accent1">
+                <a:shade val="50000"/>
+              </a:schemeClr>
+            </a:lnRef>
+            <a:fillRef idx="1">
+              <a:schemeClr val="accent1"/>
+            </a:fillRef>
+            <a:effectRef idx="0">
+              <a:schemeClr val="accent1"/>
+            </a:effectRef>
+            <a:fontRef idx="minor">
+              <a:schemeClr val="lt1"/>
+            </a:fontRef>
+          </p:style>
+          <p:txBody>
+            <a:bodyPr rtlCol="0" anchor="ctr"/>
+            <a:lstStyle/>
+            <a:p>
+              <a:pPr algn="ctr"/>
+              <a:endParaRPr lang="en-US"/>
+            </a:p>
+          </p:txBody>
+        </p:sp>
+      </p:grpSp>
+    </p:spTree>
+    <p:extLst>
+      <p:ext uri="{BB962C8B-B14F-4D97-AF65-F5344CB8AC3E}">
+        <p14:creationId xmlns:p14="http://schemas.microsoft.com/office/powerpoint/2010/main" val="3950465381"/>
+      </p:ext>
+    </p:extLst>
+  </p:cSld>
+  <p:clrMapOvr>
+    <a:masterClrMapping/>
+  </p:clrMapOvr>
+  <p:timing>
+    <p:tnLst>
+      <p:par>
+        <p:cTn id="1" dur="indefinite" restart="never" nodeType="tmRoot">
+          <p:childTnLst>
+            <p:seq concurrent="1" nextAc="seek">
+              <p:cTn id="2" dur="indefinite" nodeType="mainSeq">
+                <p:childTnLst>
+                  <p:par>
+                    <p:cTn id="3" fill="hold">
+                      <p:stCondLst>
+                        <p:cond delay="indefinite"/>
+                      </p:stCondLst>
+                      <p:childTnLst>
+                        <p:par>
+                          <p:cTn id="4" fill="hold">
+                            <p:stCondLst>
+                              <p:cond delay="0"/>
+                            </p:stCondLst>
+                            <p:childTnLst>
+                              <p:par>
+                                <p:cTn id="5" presetID="10" presetClass="entr" presetSubtype="0" fill="hold" grpId="0" nodeType="clickEffect">
+                                  <p:stCondLst>
+                                    <p:cond delay="0"/>
+                                  </p:stCondLst>
+                                  <p:childTnLst>
+                                    <p:set>
+                                      <p:cBhvr>
+                                        <p:cTn id="6" dur="1" fill="hold">
+                                          <p:stCondLst>
+                                            <p:cond delay="0"/>
+                                          </p:stCondLst>
+                                        </p:cTn>
+                                        <p:tgtEl>
+                                          <p:spTgt spid="3">
+                                            <p:txEl>
+                                              <p:pRg st="0" end="0"/>
+                                            </p:txEl>
+                                          </p:spTgt>
+                                        </p:tgtEl>
+                                        <p:attrNameLst>
+                                          <p:attrName>style.visibility</p:attrName>
+                                        </p:attrNameLst>
+                                      </p:cBhvr>
+                                      <p:to>
+                                        <p:strVal val="visible"/>
+                                      </p:to>
+                                    </p:set>
+                                    <p:animEffect transition="in" filter="fade">
+                                      <p:cBhvr>
+                                        <p:cTn id="7" dur="500"/>
+                                        <p:tgtEl>
+                                          <p:spTgt spid="3">
+                                            <p:txEl>
+                                              <p:pRg st="0" end="0"/>
+                                            </p:txEl>
+                                          </p:spTgt>
+                                        </p:tgtEl>
+                                      </p:cBhvr>
+                                    </p:animEffect>
+                                  </p:childTnLst>
+                                </p:cTn>
+                              </p:par>
+                              <p:par>
+                                <p:cTn id="8" presetID="10" presetClass="entr" presetSubtype="0" fill="hold" nodeType="withEffect">
+                                  <p:stCondLst>
+                                    <p:cond delay="0"/>
+                                  </p:stCondLst>
+                                  <p:childTnLst>
+                                    <p:set>
+                                      <p:cBhvr>
+                                        <p:cTn id="9" dur="1" fill="hold">
+                                          <p:stCondLst>
+                                            <p:cond delay="0"/>
+                                          </p:stCondLst>
+                                        </p:cTn>
+                                        <p:tgtEl>
+                                          <p:spTgt spid="4"/>
+                                        </p:tgtEl>
+                                        <p:attrNameLst>
+                                          <p:attrName>style.visibility</p:attrName>
+                                        </p:attrNameLst>
+                                      </p:cBhvr>
+                                      <p:to>
+                                        <p:strVal val="visible"/>
+                                      </p:to>
+                                    </p:set>
+                                    <p:animEffect transition="in" filter="fade">
+                                      <p:cBhvr>
+                                        <p:cTn id="10" dur="500"/>
+                                        <p:tgtEl>
+                                          <p:spTgt spid="4"/>
+                                        </p:tgtEl>
+                                      </p:cBhvr>
+                                    </p:animEffect>
+                                  </p:childTnLst>
+                                </p:cTn>
+                              </p:par>
+                            </p:childTnLst>
+                          </p:cTn>
+                        </p:par>
+                      </p:childTnLst>
+                    </p:cTn>
+                  </p:par>
+                  <p:par>
+                    <p:cTn id="11" fill="hold">
+                      <p:stCondLst>
+                        <p:cond delay="indefinite"/>
+                      </p:stCondLst>
+                      <p:childTnLst>
+                        <p:par>
+                          <p:cTn id="12" fill="hold">
+                            <p:stCondLst>
+                              <p:cond delay="0"/>
+                            </p:stCondLst>
+                            <p:childTnLst>
+                              <p:par>
+                                <p:cTn id="13" presetID="10" presetClass="entr" presetSubtype="0" fill="hold" grpId="0" nodeType="clickEffect">
+                                  <p:stCondLst>
+                                    <p:cond delay="0"/>
+                                  </p:stCondLst>
+                                  <p:childTnLst>
+                                    <p:set>
+                                      <p:cBhvr>
+                                        <p:cTn id="14" dur="1" fill="hold">
+                                          <p:stCondLst>
+                                            <p:cond delay="0"/>
+                                          </p:stCondLst>
+                                        </p:cTn>
+                                        <p:tgtEl>
+                                          <p:spTgt spid="3">
+                                            <p:txEl>
+                                              <p:pRg st="1" end="1"/>
+                                            </p:txEl>
+                                          </p:spTgt>
+                                        </p:tgtEl>
+                                        <p:attrNameLst>
+                                          <p:attrName>style.visibility</p:attrName>
+                                        </p:attrNameLst>
+                                      </p:cBhvr>
+                                      <p:to>
+                                        <p:strVal val="visible"/>
+                                      </p:to>
+                                    </p:set>
+                                    <p:animEffect transition="in" filter="fade">
+                                      <p:cBhvr>
+                                        <p:cTn id="15" dur="500"/>
+                                        <p:tgtEl>
+                                          <p:spTgt spid="3">
+                                            <p:txEl>
+                                              <p:pRg st="1" end="1"/>
+                                            </p:txEl>
+                                          </p:spTgt>
+                                        </p:tgtEl>
+                                      </p:cBhvr>
+                                    </p:animEffect>
+                                  </p:childTnLst>
+                                </p:cTn>
+                              </p:par>
+                              <p:par>
+                                <p:cTn id="16" presetID="10" presetClass="entr" presetSubtype="0" fill="hold" nodeType="withEffect">
+                                  <p:stCondLst>
+                                    <p:cond delay="0"/>
+                                  </p:stCondLst>
+                                  <p:childTnLst>
+                                    <p:set>
+                                      <p:cBhvr>
+                                        <p:cTn id="17" dur="1" fill="hold">
+                                          <p:stCondLst>
+                                            <p:cond delay="0"/>
+                                          </p:stCondLst>
+                                        </p:cTn>
+                                        <p:tgtEl>
+                                          <p:spTgt spid="10"/>
+                                        </p:tgtEl>
+                                        <p:attrNameLst>
+                                          <p:attrName>style.visibility</p:attrName>
+                                        </p:attrNameLst>
+                                      </p:cBhvr>
+                                      <p:to>
+                                        <p:strVal val="visible"/>
+                                      </p:to>
+                                    </p:set>
+                                    <p:animEffect transition="in" filter="fade">
+                                      <p:cBhvr>
+                                        <p:cTn id="18" dur="500"/>
+                                        <p:tgtEl>
+                                          <p:spTgt spid="10"/>
+                                        </p:tgtEl>
+                                      </p:cBhvr>
+                                    </p:animEffect>
+                                  </p:childTnLst>
+                                </p:cTn>
+                              </p:par>
+                            </p:childTnLst>
+                          </p:cTn>
+                        </p:par>
+                      </p:childTnLst>
+                    </p:cTn>
+                  </p:par>
+                  <p:par>
+                    <p:cTn id="19" fill="hold">
+                      <p:stCondLst>
+                        <p:cond delay="indefinite"/>
+                      </p:stCondLst>
+                      <p:childTnLst>
+                        <p:par>
+                          <p:cTn id="20" fill="hold">
+                            <p:stCondLst>
+                              <p:cond delay="0"/>
+                            </p:stCondLst>
+                            <p:childTnLst>
+                              <p:par>
+                                <p:cTn id="21" presetID="10" presetClass="entr" presetSubtype="0" fill="hold" grpId="0" nodeType="clickEffect">
+                                  <p:stCondLst>
+                                    <p:cond delay="0"/>
+                                  </p:stCondLst>
+                                  <p:childTnLst>
+                                    <p:set>
+                                      <p:cBhvr>
+                                        <p:cTn id="22" dur="1" fill="hold">
+                                          <p:stCondLst>
+                                            <p:cond delay="0"/>
+                                          </p:stCondLst>
+                                        </p:cTn>
+                                        <p:tgtEl>
+                                          <p:spTgt spid="3">
+                                            <p:txEl>
+                                              <p:pRg st="2" end="2"/>
+                                            </p:txEl>
+                                          </p:spTgt>
+                                        </p:tgtEl>
+                                        <p:attrNameLst>
+                                          <p:attrName>style.visibility</p:attrName>
+                                        </p:attrNameLst>
+                                      </p:cBhvr>
+                                      <p:to>
+                                        <p:strVal val="visible"/>
+                                      </p:to>
+                                    </p:set>
+                                    <p:animEffect transition="in" filter="fade">
+                                      <p:cBhvr>
+                                        <p:cTn id="23" dur="500"/>
+                                        <p:tgtEl>
+                                          <p:spTgt spid="3">
+                                            <p:txEl>
+                                              <p:pRg st="2" end="2"/>
+                                            </p:txEl>
+                                          </p:spTgt>
+                                        </p:tgtEl>
+                                      </p:cBhvr>
+                                    </p:animEffect>
+                                  </p:childTnLst>
+                                </p:cTn>
+                              </p:par>
+                              <p:par>
+                                <p:cTn id="24" presetID="10" presetClass="entr" presetSubtype="0" fill="hold" grpId="0" nodeType="withEffect">
+                                  <p:stCondLst>
+                                    <p:cond delay="0"/>
+                                  </p:stCondLst>
+                                  <p:childTnLst>
+                                    <p:set>
+                                      <p:cBhvr>
+                                        <p:cTn id="25" dur="1" fill="hold">
+                                          <p:stCondLst>
+                                            <p:cond delay="0"/>
+                                          </p:stCondLst>
+                                        </p:cTn>
+                                        <p:tgtEl>
+                                          <p:spTgt spid="8"/>
+                                        </p:tgtEl>
+                                        <p:attrNameLst>
+                                          <p:attrName>style.visibility</p:attrName>
+                                        </p:attrNameLst>
+                                      </p:cBhvr>
+                                      <p:to>
+                                        <p:strVal val="visible"/>
+                                      </p:to>
+                                    </p:set>
+                                    <p:animEffect transition="in" filter="fade">
+                                      <p:cBhvr>
+                                        <p:cTn id="26" dur="500"/>
+                                        <p:tgtEl>
+                                          <p:spTgt spid="8"/>
+                                        </p:tgtEl>
+                                      </p:cBhvr>
+                                    </p:animEffect>
+                                  </p:childTnLst>
+                                </p:cTn>
+                              </p:par>
+                            </p:childTnLst>
+                          </p:cTn>
+                        </p:par>
+                      </p:childTnLst>
+                    </p:cTn>
+                  </p:par>
+                </p:childTnLst>
+              </p:cTn>
+              <p:prevCondLst>
+                <p:cond evt="onPrev" delay="0">
+                  <p:tgtEl>
+                    <p:sldTgt/>
+                  </p:tgtEl>
+                </p:cond>
+              </p:prevCondLst>
+              <p:nextCondLst>
+                <p:cond evt="onNext" delay="0">
+                  <p:tgtEl>
+                    <p:sldTgt/>
+                  </p:tgtEl>
+                </p:cond>
+              </p:nextCondLst>
+            </p:seq>
+          </p:childTnLst>
+        </p:cTn>
+      </p:par>
+    </p:tnLst>
+    <p:bldLst>
+      <p:bldP spid="3" grpId="0" build="p"/>
+      <p:bldP spid="8" grpId="0" animBg="1"/>
+    </p:bldLst>
+  </p:timing>
+</p:sld>
+</file>
+
+<file path=ppt/slides/slide11.xml><?xml version="1.0" encoding="utf-8"?>
+<p:sld xmlns:a="http://schemas.openxmlformats.org/drawingml/2006/main" xmlns:r="http://schemas.openxmlformats.org/officeDocument/2006/relationships" xmlns:p="http://schemas.openxmlformats.org/presentationml/2006/main">
+  <p:cSld>
+    <p:spTree>
+      <p:nvGrpSpPr>
+        <p:cNvPr id="1" name=""/>
+        <p:cNvGrpSpPr/>
+        <p:nvPr/>
+      </p:nvGrpSpPr>
+      <p:grpSpPr>
+        <a:xfrm>
+          <a:off x="0" y="0"/>
+          <a:ext cx="0" cy="0"/>
+          <a:chOff x="0" y="0"/>
+          <a:chExt cx="0" cy="0"/>
+        </a:xfrm>
+      </p:grpSpPr>
+      <p:sp>
+        <p:nvSpPr>
+          <p:cNvPr id="2" name="Title 1"/>
+          <p:cNvSpPr>
+            <a:spLocks noGrp="1"/>
+          </p:cNvSpPr>
+          <p:nvPr>
+            <p:ph type="title"/>
+          </p:nvPr>
+        </p:nvSpPr>
+        <p:spPr/>
+        <p:txBody>
+          <a:bodyPr/>
+          <a:lstStyle/>
+          <a:p>
+            <a:r>
+              <a:rPr lang="en-US" dirty="0" smtClean="0"/>
+              <a:t>Appendix</a:t>
+            </a:r>
+            <a:endParaRPr lang="en-US" dirty="0"/>
+          </a:p>
+        </p:txBody>
+      </p:sp>
+      <p:sp>
+        <p:nvSpPr>
+          <p:cNvPr id="3" name="Content Placeholder 2"/>
+          <p:cNvSpPr>
+            <a:spLocks noGrp="1"/>
+          </p:cNvSpPr>
+          <p:nvPr>
+            <p:ph idx="1"/>
+          </p:nvPr>
+        </p:nvSpPr>
+        <p:spPr/>
+        <p:txBody>
+          <a:bodyPr/>
+          <a:lstStyle/>
+          <a:p>
+            <a:endParaRPr lang="en-US" dirty="0"/>
+          </a:p>
+        </p:txBody>
+      </p:sp>
+    </p:spTree>
+    <p:extLst>
+      <p:ext uri="{BB962C8B-B14F-4D97-AF65-F5344CB8AC3E}">
+        <p14:creationId xmlns:p14="http://schemas.microsoft.com/office/powerpoint/2010/main" val="2844641472"/>
+      </p:ext>
+    </p:extLst>
+  </p:cSld>
+  <p:clrMapOvr>
+    <a:masterClrMapping/>
+  </p:clrMapOvr>
+</p:sld>
+</file>
+
+<file path=ppt/slides/slide12.xml><?xml version="1.0" encoding="utf-8"?>
+<p:sld xmlns:a="http://schemas.openxmlformats.org/drawingml/2006/main" xmlns:r="http://schemas.openxmlformats.org/officeDocument/2006/relationships" xmlns:p="http://schemas.openxmlformats.org/presentationml/2006/main">
+  <p:cSld>
+    <p:spTree>
+      <p:nvGrpSpPr>
+        <p:cNvPr id="1" name=""/>
+        <p:cNvGrpSpPr/>
+        <p:nvPr/>
+      </p:nvGrpSpPr>
+      <p:grpSpPr>
+        <a:xfrm>
+          <a:off x="0" y="0"/>
+          <a:ext cx="0" cy="0"/>
+          <a:chOff x="0" y="0"/>
+          <a:chExt cx="0" cy="0"/>
+        </a:xfrm>
+      </p:grpSpPr>
+      <p:sp>
+        <p:nvSpPr>
+          <p:cNvPr id="2" name="Title 1"/>
+          <p:cNvSpPr>
+            <a:spLocks noGrp="1"/>
+          </p:cNvSpPr>
+          <p:nvPr>
+            <p:ph type="title"/>
+          </p:nvPr>
+        </p:nvSpPr>
+        <p:spPr>
+          <a:xfrm>
+            <a:off x="228601" y="0"/>
+            <a:ext cx="10131425" cy="996463"/>
+          </a:xfrm>
+        </p:spPr>
+        <p:txBody>
+          <a:bodyPr/>
+          <a:lstStyle/>
+          <a:p>
+            <a:r>
+              <a:rPr lang="en-US" dirty="0" smtClean="0"/>
+              <a:t>Correlation matrix of features</a:t>
+            </a:r>
+            <a:endParaRPr lang="en-US" dirty="0"/>
+          </a:p>
+        </p:txBody>
+      </p:sp>
+      <p:pic>
+        <p:nvPicPr>
+          <p:cNvPr id="4" name="Content Placeholder 3"/>
+          <p:cNvPicPr>
+            <a:picLocks noGrp="1" noChangeAspect="1"/>
+          </p:cNvPicPr>
+          <p:nvPr>
+            <p:ph idx="1"/>
+          </p:nvPr>
+        </p:nvPicPr>
+        <p:blipFill>
+          <a:blip r:embed="rId2">
+            <a:extLst>
+              <a:ext uri="{28A0092B-C50C-407E-A947-70E740481C1C}">
+                <a14:useLocalDpi xmlns:a14="http://schemas.microsoft.com/office/drawing/2010/main" val="0"/>
+              </a:ext>
+            </a:extLst>
+          </a:blip>
+          <a:stretch>
+            <a:fillRect/>
+          </a:stretch>
+        </p:blipFill>
+        <p:spPr>
+          <a:xfrm>
+            <a:off x="326858" y="820617"/>
+            <a:ext cx="11349326" cy="5796806"/>
+          </a:xfrm>
+        </p:spPr>
+      </p:pic>
+    </p:spTree>
+    <p:extLst>
+      <p:ext uri="{BB962C8B-B14F-4D97-AF65-F5344CB8AC3E}">
+        <p14:creationId xmlns:p14="http://schemas.microsoft.com/office/powerpoint/2010/main" val="1474668705"/>
+      </p:ext>
+    </p:extLst>
+  </p:cSld>
+  <p:clrMapOvr>
+    <a:masterClrMapping/>
+  </p:clrMapOvr>
+</p:sld>
+</file>
+
 <file path=ppt/slides/slide2.xml><?xml version="1.0" encoding="utf-8"?>
 <p:sld xmlns:a="http://schemas.openxmlformats.org/drawingml/2006/main" xmlns:r="http://schemas.openxmlformats.org/officeDocument/2006/relationships" xmlns:p="http://schemas.openxmlformats.org/presentationml/2006/main">
   <p:cSld>
@@ -6387,7 +7611,12 @@
             <p:ph idx="1"/>
           </p:nvPr>
         </p:nvSpPr>
-        <p:spPr/>
+        <p:spPr>
+          <a:xfrm>
+            <a:off x="1647090" y="2142067"/>
+            <a:ext cx="10131425" cy="3649133"/>
+          </a:xfrm>
+        </p:spPr>
         <p:txBody>
           <a:bodyPr/>
           <a:lstStyle/>
@@ -6678,7 +7907,7 @@
       </p:par>
     </p:tnLst>
     <p:bldLst>
-      <p:bldP spid="3" grpId="0" build="p"/>
+      <p:bldP spid="3" grpId="0" uiExpand="1" build="p"/>
     </p:bldLst>
   </p:timing>
 </p:sld>
@@ -7016,11 +8245,7 @@
             <a:pPr algn="ctr"/>
             <a:r>
               <a:rPr lang="en-US" sz="1400" dirty="0" smtClean="0"/>
-              <a:t>PROTON </a:t>
-            </a:r>
-            <a:r>
-              <a:rPr lang="en-US" sz="1400" dirty="0" smtClean="0"/>
-              <a:t>&amp; ELECTRON FLUX</a:t>
+              <a:t>PROTON &amp; ELECTRON FLUX</a:t>
             </a:r>
             <a:endParaRPr lang="en-US" dirty="0"/>
           </a:p>
@@ -7240,15 +8465,7 @@
             <a:pPr algn="ctr"/>
             <a:r>
               <a:rPr lang="en-US" dirty="0" smtClean="0"/>
-              <a:t>Time Series Data (1997 – </a:t>
-            </a:r>
-            <a:r>
-              <a:rPr lang="en-US" dirty="0" smtClean="0"/>
-              <a:t>2014</a:t>
-            </a:r>
-            <a:r>
-              <a:rPr lang="en-US" dirty="0" smtClean="0"/>
-              <a:t>)</a:t>
+              <a:t>Time Series Data (1997 – 2014)</a:t>
             </a:r>
             <a:endParaRPr lang="en-US" dirty="0"/>
           </a:p>
@@ -7295,15 +8512,7 @@
             <a:pPr algn="ctr"/>
             <a:r>
               <a:rPr lang="en-US" dirty="0" smtClean="0"/>
-              <a:t>Rolling Sum Data (1997 – </a:t>
-            </a:r>
-            <a:r>
-              <a:rPr lang="en-US" dirty="0" smtClean="0"/>
-              <a:t>2014</a:t>
-            </a:r>
-            <a:r>
-              <a:rPr lang="en-US" dirty="0" smtClean="0"/>
-              <a:t>)</a:t>
+              <a:t>Rolling Sum Data (1997 – 2014)</a:t>
             </a:r>
             <a:endParaRPr lang="en-US" dirty="0"/>
           </a:p>
@@ -7563,6 +8772,650 @@
   <p:clrMapOvr>
     <a:masterClrMapping/>
   </p:clrMapOvr>
+  <p:timing>
+    <p:tnLst>
+      <p:par>
+        <p:cTn id="1" dur="indefinite" restart="never" nodeType="tmRoot">
+          <p:childTnLst>
+            <p:seq concurrent="1" nextAc="seek">
+              <p:cTn id="2" dur="indefinite" nodeType="mainSeq">
+                <p:childTnLst>
+                  <p:par>
+                    <p:cTn id="3" fill="hold">
+                      <p:stCondLst>
+                        <p:cond delay="indefinite"/>
+                      </p:stCondLst>
+                      <p:childTnLst>
+                        <p:par>
+                          <p:cTn id="4" fill="hold">
+                            <p:stCondLst>
+                              <p:cond delay="0"/>
+                            </p:stCondLst>
+                            <p:childTnLst>
+                              <p:par>
+                                <p:cTn id="5" presetID="10" presetClass="entr" presetSubtype="0" fill="hold" grpId="0" nodeType="clickEffect">
+                                  <p:stCondLst>
+                                    <p:cond delay="0"/>
+                                  </p:stCondLst>
+                                  <p:childTnLst>
+                                    <p:set>
+                                      <p:cBhvr>
+                                        <p:cTn id="6" dur="1" fill="hold">
+                                          <p:stCondLst>
+                                            <p:cond delay="0"/>
+                                          </p:stCondLst>
+                                        </p:cTn>
+                                        <p:tgtEl>
+                                          <p:spTgt spid="5"/>
+                                        </p:tgtEl>
+                                        <p:attrNameLst>
+                                          <p:attrName>style.visibility</p:attrName>
+                                        </p:attrNameLst>
+                                      </p:cBhvr>
+                                      <p:to>
+                                        <p:strVal val="visible"/>
+                                      </p:to>
+                                    </p:set>
+                                    <p:animEffect transition="in" filter="fade">
+                                      <p:cBhvr>
+                                        <p:cTn id="7" dur="1000"/>
+                                        <p:tgtEl>
+                                          <p:spTgt spid="5"/>
+                                        </p:tgtEl>
+                                      </p:cBhvr>
+                                    </p:animEffect>
+                                  </p:childTnLst>
+                                </p:cTn>
+                              </p:par>
+                              <p:par>
+                                <p:cTn id="8" presetID="10" presetClass="entr" presetSubtype="0" fill="hold" grpId="0" nodeType="withEffect">
+                                  <p:stCondLst>
+                                    <p:cond delay="0"/>
+                                  </p:stCondLst>
+                                  <p:childTnLst>
+                                    <p:set>
+                                      <p:cBhvr>
+                                        <p:cTn id="9" dur="1" fill="hold">
+                                          <p:stCondLst>
+                                            <p:cond delay="0"/>
+                                          </p:stCondLst>
+                                        </p:cTn>
+                                        <p:tgtEl>
+                                          <p:spTgt spid="6"/>
+                                        </p:tgtEl>
+                                        <p:attrNameLst>
+                                          <p:attrName>style.visibility</p:attrName>
+                                        </p:attrNameLst>
+                                      </p:cBhvr>
+                                      <p:to>
+                                        <p:strVal val="visible"/>
+                                      </p:to>
+                                    </p:set>
+                                    <p:animEffect transition="in" filter="fade">
+                                      <p:cBhvr>
+                                        <p:cTn id="10" dur="1000"/>
+                                        <p:tgtEl>
+                                          <p:spTgt spid="6"/>
+                                        </p:tgtEl>
+                                      </p:cBhvr>
+                                    </p:animEffect>
+                                  </p:childTnLst>
+                                </p:cTn>
+                              </p:par>
+                              <p:par>
+                                <p:cTn id="11" presetID="10" presetClass="entr" presetSubtype="0" fill="hold" grpId="0" nodeType="withEffect">
+                                  <p:stCondLst>
+                                    <p:cond delay="0"/>
+                                  </p:stCondLst>
+                                  <p:childTnLst>
+                                    <p:set>
+                                      <p:cBhvr>
+                                        <p:cTn id="12" dur="1" fill="hold">
+                                          <p:stCondLst>
+                                            <p:cond delay="0"/>
+                                          </p:stCondLst>
+                                        </p:cTn>
+                                        <p:tgtEl>
+                                          <p:spTgt spid="4"/>
+                                        </p:tgtEl>
+                                        <p:attrNameLst>
+                                          <p:attrName>style.visibility</p:attrName>
+                                        </p:attrNameLst>
+                                      </p:cBhvr>
+                                      <p:to>
+                                        <p:strVal val="visible"/>
+                                      </p:to>
+                                    </p:set>
+                                    <p:animEffect transition="in" filter="fade">
+                                      <p:cBhvr>
+                                        <p:cTn id="13" dur="1000"/>
+                                        <p:tgtEl>
+                                          <p:spTgt spid="4"/>
+                                        </p:tgtEl>
+                                      </p:cBhvr>
+                                    </p:animEffect>
+                                  </p:childTnLst>
+                                </p:cTn>
+                              </p:par>
+                              <p:par>
+                                <p:cTn id="14" presetID="10" presetClass="entr" presetSubtype="0" fill="hold" grpId="0" nodeType="withEffect">
+                                  <p:stCondLst>
+                                    <p:cond delay="0"/>
+                                  </p:stCondLst>
+                                  <p:childTnLst>
+                                    <p:set>
+                                      <p:cBhvr>
+                                        <p:cTn id="15" dur="1" fill="hold">
+                                          <p:stCondLst>
+                                            <p:cond delay="0"/>
+                                          </p:stCondLst>
+                                        </p:cTn>
+                                        <p:tgtEl>
+                                          <p:spTgt spid="10"/>
+                                        </p:tgtEl>
+                                        <p:attrNameLst>
+                                          <p:attrName>style.visibility</p:attrName>
+                                        </p:attrNameLst>
+                                      </p:cBhvr>
+                                      <p:to>
+                                        <p:strVal val="visible"/>
+                                      </p:to>
+                                    </p:set>
+                                    <p:animEffect transition="in" filter="fade">
+                                      <p:cBhvr>
+                                        <p:cTn id="16" dur="1000"/>
+                                        <p:tgtEl>
+                                          <p:spTgt spid="10"/>
+                                        </p:tgtEl>
+                                      </p:cBhvr>
+                                    </p:animEffect>
+                                  </p:childTnLst>
+                                </p:cTn>
+                              </p:par>
+                            </p:childTnLst>
+                          </p:cTn>
+                        </p:par>
+                      </p:childTnLst>
+                    </p:cTn>
+                  </p:par>
+                  <p:par>
+                    <p:cTn id="17" fill="hold">
+                      <p:stCondLst>
+                        <p:cond delay="indefinite"/>
+                      </p:stCondLst>
+                      <p:childTnLst>
+                        <p:par>
+                          <p:cTn id="18" fill="hold">
+                            <p:stCondLst>
+                              <p:cond delay="0"/>
+                            </p:stCondLst>
+                            <p:childTnLst>
+                              <p:par>
+                                <p:cTn id="19" presetID="10" presetClass="entr" presetSubtype="0" fill="hold" grpId="0" nodeType="clickEffect">
+                                  <p:stCondLst>
+                                    <p:cond delay="0"/>
+                                  </p:stCondLst>
+                                  <p:childTnLst>
+                                    <p:set>
+                                      <p:cBhvr>
+                                        <p:cTn id="20" dur="1" fill="hold">
+                                          <p:stCondLst>
+                                            <p:cond delay="0"/>
+                                          </p:stCondLst>
+                                        </p:cTn>
+                                        <p:tgtEl>
+                                          <p:spTgt spid="7"/>
+                                        </p:tgtEl>
+                                        <p:attrNameLst>
+                                          <p:attrName>style.visibility</p:attrName>
+                                        </p:attrNameLst>
+                                      </p:cBhvr>
+                                      <p:to>
+                                        <p:strVal val="visible"/>
+                                      </p:to>
+                                    </p:set>
+                                    <p:animEffect transition="in" filter="fade">
+                                      <p:cBhvr>
+                                        <p:cTn id="21" dur="1000"/>
+                                        <p:tgtEl>
+                                          <p:spTgt spid="7"/>
+                                        </p:tgtEl>
+                                      </p:cBhvr>
+                                    </p:animEffect>
+                                  </p:childTnLst>
+                                </p:cTn>
+                              </p:par>
+                              <p:par>
+                                <p:cTn id="22" presetID="10" presetClass="entr" presetSubtype="0" fill="hold" grpId="0" nodeType="withEffect">
+                                  <p:stCondLst>
+                                    <p:cond delay="0"/>
+                                  </p:stCondLst>
+                                  <p:childTnLst>
+                                    <p:set>
+                                      <p:cBhvr>
+                                        <p:cTn id="23" dur="1" fill="hold">
+                                          <p:stCondLst>
+                                            <p:cond delay="0"/>
+                                          </p:stCondLst>
+                                        </p:cTn>
+                                        <p:tgtEl>
+                                          <p:spTgt spid="8"/>
+                                        </p:tgtEl>
+                                        <p:attrNameLst>
+                                          <p:attrName>style.visibility</p:attrName>
+                                        </p:attrNameLst>
+                                      </p:cBhvr>
+                                      <p:to>
+                                        <p:strVal val="visible"/>
+                                      </p:to>
+                                    </p:set>
+                                    <p:animEffect transition="in" filter="fade">
+                                      <p:cBhvr>
+                                        <p:cTn id="24" dur="500"/>
+                                        <p:tgtEl>
+                                          <p:spTgt spid="8"/>
+                                        </p:tgtEl>
+                                      </p:cBhvr>
+                                    </p:animEffect>
+                                  </p:childTnLst>
+                                </p:cTn>
+                              </p:par>
+                              <p:par>
+                                <p:cTn id="25" presetID="10" presetClass="entr" presetSubtype="0" fill="hold" grpId="0" nodeType="withEffect">
+                                  <p:stCondLst>
+                                    <p:cond delay="0"/>
+                                  </p:stCondLst>
+                                  <p:childTnLst>
+                                    <p:set>
+                                      <p:cBhvr>
+                                        <p:cTn id="26" dur="1" fill="hold">
+                                          <p:stCondLst>
+                                            <p:cond delay="0"/>
+                                          </p:stCondLst>
+                                        </p:cTn>
+                                        <p:tgtEl>
+                                          <p:spTgt spid="9"/>
+                                        </p:tgtEl>
+                                        <p:attrNameLst>
+                                          <p:attrName>style.visibility</p:attrName>
+                                        </p:attrNameLst>
+                                      </p:cBhvr>
+                                      <p:to>
+                                        <p:strVal val="visible"/>
+                                      </p:to>
+                                    </p:set>
+                                    <p:animEffect transition="in" filter="fade">
+                                      <p:cBhvr>
+                                        <p:cTn id="27" dur="500"/>
+                                        <p:tgtEl>
+                                          <p:spTgt spid="9"/>
+                                        </p:tgtEl>
+                                      </p:cBhvr>
+                                    </p:animEffect>
+                                  </p:childTnLst>
+                                </p:cTn>
+                              </p:par>
+                            </p:childTnLst>
+                          </p:cTn>
+                        </p:par>
+                      </p:childTnLst>
+                    </p:cTn>
+                  </p:par>
+                  <p:par>
+                    <p:cTn id="28" fill="hold">
+                      <p:stCondLst>
+                        <p:cond delay="indefinite"/>
+                      </p:stCondLst>
+                      <p:childTnLst>
+                        <p:par>
+                          <p:cTn id="29" fill="hold">
+                            <p:stCondLst>
+                              <p:cond delay="0"/>
+                            </p:stCondLst>
+                            <p:childTnLst>
+                              <p:par>
+                                <p:cTn id="30" presetID="10" presetClass="entr" presetSubtype="0" fill="hold" grpId="0" nodeType="clickEffect">
+                                  <p:stCondLst>
+                                    <p:cond delay="0"/>
+                                  </p:stCondLst>
+                                  <p:childTnLst>
+                                    <p:set>
+                                      <p:cBhvr>
+                                        <p:cTn id="31" dur="1" fill="hold">
+                                          <p:stCondLst>
+                                            <p:cond delay="0"/>
+                                          </p:stCondLst>
+                                        </p:cTn>
+                                        <p:tgtEl>
+                                          <p:spTgt spid="11"/>
+                                        </p:tgtEl>
+                                        <p:attrNameLst>
+                                          <p:attrName>style.visibility</p:attrName>
+                                        </p:attrNameLst>
+                                      </p:cBhvr>
+                                      <p:to>
+                                        <p:strVal val="visible"/>
+                                      </p:to>
+                                    </p:set>
+                                    <p:animEffect transition="in" filter="fade">
+                                      <p:cBhvr>
+                                        <p:cTn id="32" dur="500"/>
+                                        <p:tgtEl>
+                                          <p:spTgt spid="11"/>
+                                        </p:tgtEl>
+                                      </p:cBhvr>
+                                    </p:animEffect>
+                                  </p:childTnLst>
+                                </p:cTn>
+                              </p:par>
+                              <p:par>
+                                <p:cTn id="33" presetID="10" presetClass="entr" presetSubtype="0" fill="hold" grpId="0" nodeType="withEffect">
+                                  <p:stCondLst>
+                                    <p:cond delay="0"/>
+                                  </p:stCondLst>
+                                  <p:childTnLst>
+                                    <p:set>
+                                      <p:cBhvr>
+                                        <p:cTn id="34" dur="1" fill="hold">
+                                          <p:stCondLst>
+                                            <p:cond delay="0"/>
+                                          </p:stCondLst>
+                                        </p:cTn>
+                                        <p:tgtEl>
+                                          <p:spTgt spid="13"/>
+                                        </p:tgtEl>
+                                        <p:attrNameLst>
+                                          <p:attrName>style.visibility</p:attrName>
+                                        </p:attrNameLst>
+                                      </p:cBhvr>
+                                      <p:to>
+                                        <p:strVal val="visible"/>
+                                      </p:to>
+                                    </p:set>
+                                    <p:animEffect transition="in" filter="fade">
+                                      <p:cBhvr>
+                                        <p:cTn id="35" dur="1000"/>
+                                        <p:tgtEl>
+                                          <p:spTgt spid="13"/>
+                                        </p:tgtEl>
+                                      </p:cBhvr>
+                                    </p:animEffect>
+                                  </p:childTnLst>
+                                </p:cTn>
+                              </p:par>
+                              <p:par>
+                                <p:cTn id="36" presetID="10" presetClass="entr" presetSubtype="0" fill="hold" grpId="0" nodeType="withEffect">
+                                  <p:stCondLst>
+                                    <p:cond delay="0"/>
+                                  </p:stCondLst>
+                                  <p:childTnLst>
+                                    <p:set>
+                                      <p:cBhvr>
+                                        <p:cTn id="37" dur="1" fill="hold">
+                                          <p:stCondLst>
+                                            <p:cond delay="0"/>
+                                          </p:stCondLst>
+                                        </p:cTn>
+                                        <p:tgtEl>
+                                          <p:spTgt spid="21"/>
+                                        </p:tgtEl>
+                                        <p:attrNameLst>
+                                          <p:attrName>style.visibility</p:attrName>
+                                        </p:attrNameLst>
+                                      </p:cBhvr>
+                                      <p:to>
+                                        <p:strVal val="visible"/>
+                                      </p:to>
+                                    </p:set>
+                                    <p:animEffect transition="in" filter="fade">
+                                      <p:cBhvr>
+                                        <p:cTn id="38" dur="500"/>
+                                        <p:tgtEl>
+                                          <p:spTgt spid="21"/>
+                                        </p:tgtEl>
+                                      </p:cBhvr>
+                                    </p:animEffect>
+                                  </p:childTnLst>
+                                </p:cTn>
+                              </p:par>
+                              <p:par>
+                                <p:cTn id="39" presetID="10" presetClass="entr" presetSubtype="0" fill="hold" grpId="0" nodeType="withEffect">
+                                  <p:stCondLst>
+                                    <p:cond delay="0"/>
+                                  </p:stCondLst>
+                                  <p:childTnLst>
+                                    <p:set>
+                                      <p:cBhvr>
+                                        <p:cTn id="40" dur="1" fill="hold">
+                                          <p:stCondLst>
+                                            <p:cond delay="0"/>
+                                          </p:stCondLst>
+                                        </p:cTn>
+                                        <p:tgtEl>
+                                          <p:spTgt spid="16"/>
+                                        </p:tgtEl>
+                                        <p:attrNameLst>
+                                          <p:attrName>style.visibility</p:attrName>
+                                        </p:attrNameLst>
+                                      </p:cBhvr>
+                                      <p:to>
+                                        <p:strVal val="visible"/>
+                                      </p:to>
+                                    </p:set>
+                                    <p:animEffect transition="in" filter="fade">
+                                      <p:cBhvr>
+                                        <p:cTn id="41" dur="500"/>
+                                        <p:tgtEl>
+                                          <p:spTgt spid="16"/>
+                                        </p:tgtEl>
+                                      </p:cBhvr>
+                                    </p:animEffect>
+                                  </p:childTnLst>
+                                </p:cTn>
+                              </p:par>
+                            </p:childTnLst>
+                          </p:cTn>
+                        </p:par>
+                      </p:childTnLst>
+                    </p:cTn>
+                  </p:par>
+                  <p:par>
+                    <p:cTn id="42" fill="hold">
+                      <p:stCondLst>
+                        <p:cond delay="indefinite"/>
+                      </p:stCondLst>
+                      <p:childTnLst>
+                        <p:par>
+                          <p:cTn id="43" fill="hold">
+                            <p:stCondLst>
+                              <p:cond delay="0"/>
+                            </p:stCondLst>
+                            <p:childTnLst>
+                              <p:par>
+                                <p:cTn id="44" presetID="10" presetClass="entr" presetSubtype="0" fill="hold" grpId="0" nodeType="clickEffect">
+                                  <p:stCondLst>
+                                    <p:cond delay="0"/>
+                                  </p:stCondLst>
+                                  <p:childTnLst>
+                                    <p:set>
+                                      <p:cBhvr>
+                                        <p:cTn id="45" dur="1" fill="hold">
+                                          <p:stCondLst>
+                                            <p:cond delay="0"/>
+                                          </p:stCondLst>
+                                        </p:cTn>
+                                        <p:tgtEl>
+                                          <p:spTgt spid="15"/>
+                                        </p:tgtEl>
+                                        <p:attrNameLst>
+                                          <p:attrName>style.visibility</p:attrName>
+                                        </p:attrNameLst>
+                                      </p:cBhvr>
+                                      <p:to>
+                                        <p:strVal val="visible"/>
+                                      </p:to>
+                                    </p:set>
+                                    <p:animEffect transition="in" filter="fade">
+                                      <p:cBhvr>
+                                        <p:cTn id="46" dur="1000"/>
+                                        <p:tgtEl>
+                                          <p:spTgt spid="15"/>
+                                        </p:tgtEl>
+                                      </p:cBhvr>
+                                    </p:animEffect>
+                                  </p:childTnLst>
+                                </p:cTn>
+                              </p:par>
+                              <p:par>
+                                <p:cTn id="47" presetID="10" presetClass="entr" presetSubtype="0" fill="hold" grpId="0" nodeType="withEffect">
+                                  <p:stCondLst>
+                                    <p:cond delay="0"/>
+                                  </p:stCondLst>
+                                  <p:childTnLst>
+                                    <p:set>
+                                      <p:cBhvr>
+                                        <p:cTn id="48" dur="1" fill="hold">
+                                          <p:stCondLst>
+                                            <p:cond delay="0"/>
+                                          </p:stCondLst>
+                                        </p:cTn>
+                                        <p:tgtEl>
+                                          <p:spTgt spid="14"/>
+                                        </p:tgtEl>
+                                        <p:attrNameLst>
+                                          <p:attrName>style.visibility</p:attrName>
+                                        </p:attrNameLst>
+                                      </p:cBhvr>
+                                      <p:to>
+                                        <p:strVal val="visible"/>
+                                      </p:to>
+                                    </p:set>
+                                    <p:animEffect transition="in" filter="fade">
+                                      <p:cBhvr>
+                                        <p:cTn id="49" dur="500"/>
+                                        <p:tgtEl>
+                                          <p:spTgt spid="14"/>
+                                        </p:tgtEl>
+                                      </p:cBhvr>
+                                    </p:animEffect>
+                                  </p:childTnLst>
+                                </p:cTn>
+                              </p:par>
+                              <p:par>
+                                <p:cTn id="50" presetID="10" presetClass="entr" presetSubtype="0" fill="hold" grpId="0" nodeType="withEffect">
+                                  <p:stCondLst>
+                                    <p:cond delay="0"/>
+                                  </p:stCondLst>
+                                  <p:childTnLst>
+                                    <p:set>
+                                      <p:cBhvr>
+                                        <p:cTn id="51" dur="1" fill="hold">
+                                          <p:stCondLst>
+                                            <p:cond delay="0"/>
+                                          </p:stCondLst>
+                                        </p:cTn>
+                                        <p:tgtEl>
+                                          <p:spTgt spid="20"/>
+                                        </p:tgtEl>
+                                        <p:attrNameLst>
+                                          <p:attrName>style.visibility</p:attrName>
+                                        </p:attrNameLst>
+                                      </p:cBhvr>
+                                      <p:to>
+                                        <p:strVal val="visible"/>
+                                      </p:to>
+                                    </p:set>
+                                    <p:animEffect transition="in" filter="fade">
+                                      <p:cBhvr>
+                                        <p:cTn id="52" dur="500"/>
+                                        <p:tgtEl>
+                                          <p:spTgt spid="20"/>
+                                        </p:tgtEl>
+                                      </p:cBhvr>
+                                    </p:animEffect>
+                                  </p:childTnLst>
+                                </p:cTn>
+                              </p:par>
+                              <p:par>
+                                <p:cTn id="53" presetID="10" presetClass="entr" presetSubtype="0" fill="hold" grpId="0" nodeType="withEffect">
+                                  <p:stCondLst>
+                                    <p:cond delay="0"/>
+                                  </p:stCondLst>
+                                  <p:childTnLst>
+                                    <p:set>
+                                      <p:cBhvr>
+                                        <p:cTn id="54" dur="1" fill="hold">
+                                          <p:stCondLst>
+                                            <p:cond delay="0"/>
+                                          </p:stCondLst>
+                                        </p:cTn>
+                                        <p:tgtEl>
+                                          <p:spTgt spid="18"/>
+                                        </p:tgtEl>
+                                        <p:attrNameLst>
+                                          <p:attrName>style.visibility</p:attrName>
+                                        </p:attrNameLst>
+                                      </p:cBhvr>
+                                      <p:to>
+                                        <p:strVal val="visible"/>
+                                      </p:to>
+                                    </p:set>
+                                    <p:animEffect transition="in" filter="fade">
+                                      <p:cBhvr>
+                                        <p:cTn id="55" dur="500"/>
+                                        <p:tgtEl>
+                                          <p:spTgt spid="18"/>
+                                        </p:tgtEl>
+                                      </p:cBhvr>
+                                    </p:animEffect>
+                                  </p:childTnLst>
+                                </p:cTn>
+                              </p:par>
+                            </p:childTnLst>
+                          </p:cTn>
+                        </p:par>
+                      </p:childTnLst>
+                    </p:cTn>
+                  </p:par>
+                </p:childTnLst>
+              </p:cTn>
+              <p:prevCondLst>
+                <p:cond evt="onPrev" delay="0">
+                  <p:tgtEl>
+                    <p:sldTgt/>
+                  </p:tgtEl>
+                </p:cond>
+              </p:prevCondLst>
+              <p:nextCondLst>
+                <p:cond evt="onNext" delay="0">
+                  <p:tgtEl>
+                    <p:sldTgt/>
+                  </p:tgtEl>
+                </p:cond>
+              </p:nextCondLst>
+            </p:seq>
+          </p:childTnLst>
+        </p:cTn>
+      </p:par>
+    </p:tnLst>
+    <p:bldLst>
+      <p:bldP spid="4" grpId="0" animBg="1"/>
+      <p:bldP spid="5" grpId="0" animBg="1"/>
+      <p:bldP spid="6" grpId="0" animBg="1"/>
+      <p:bldP spid="7" grpId="0" animBg="1"/>
+      <p:bldP spid="8" grpId="0" animBg="1"/>
+      <p:bldP spid="9" grpId="0" animBg="1"/>
+      <p:bldP spid="10" grpId="0" animBg="1"/>
+      <p:bldP spid="11" grpId="0" animBg="1"/>
+      <p:bldP spid="13" grpId="0" animBg="1"/>
+      <p:bldP spid="14" grpId="0" animBg="1"/>
+      <p:bldP spid="15" grpId="0" animBg="1"/>
+      <p:bldP spid="16" grpId="0" animBg="1"/>
+      <p:bldP spid="18" grpId="0" animBg="1"/>
+      <p:bldP spid="20" grpId="0" animBg="1"/>
+      <p:bldP spid="21" grpId="0" animBg="1"/>
+    </p:bldLst>
+  </p:timing>
 </p:sld>
 </file>
 
@@ -7693,6 +9546,89 @@
   <p:clrMapOvr>
     <a:masterClrMapping/>
   </p:clrMapOvr>
+  <p:timing>
+    <p:tnLst>
+      <p:par>
+        <p:cTn id="1" dur="indefinite" restart="never" nodeType="tmRoot">
+          <p:childTnLst>
+            <p:seq concurrent="1" nextAc="seek">
+              <p:cTn id="2" dur="indefinite" nodeType="mainSeq">
+                <p:childTnLst>
+                  <p:par>
+                    <p:cTn id="3" fill="hold">
+                      <p:stCondLst>
+                        <p:cond delay="indefinite"/>
+                      </p:stCondLst>
+                      <p:childTnLst>
+                        <p:par>
+                          <p:cTn id="4" fill="hold">
+                            <p:stCondLst>
+                              <p:cond delay="0"/>
+                            </p:stCondLst>
+                            <p:childTnLst>
+                              <p:par>
+                                <p:cTn id="5" presetID="10" presetClass="entr" presetSubtype="0" fill="hold" nodeType="clickEffect">
+                                  <p:stCondLst>
+                                    <p:cond delay="0"/>
+                                  </p:stCondLst>
+                                  <p:childTnLst>
+                                    <p:set>
+                                      <p:cBhvr>
+                                        <p:cTn id="6" dur="1" fill="hold">
+                                          <p:stCondLst>
+                                            <p:cond delay="0"/>
+                                          </p:stCondLst>
+                                        </p:cTn>
+                                        <p:tgtEl>
+                                          <p:spTgt spid="5"/>
+                                        </p:tgtEl>
+                                        <p:attrNameLst>
+                                          <p:attrName>style.visibility</p:attrName>
+                                        </p:attrNameLst>
+                                      </p:cBhvr>
+                                      <p:to>
+                                        <p:strVal val="visible"/>
+                                      </p:to>
+                                    </p:set>
+                                    <p:animEffect transition="in" filter="fade">
+                                      <p:cBhvr>
+                                        <p:cTn id="7" dur="500"/>
+                                        <p:tgtEl>
+                                          <p:spTgt spid="5"/>
+                                        </p:tgtEl>
+                                      </p:cBhvr>
+                                    </p:animEffect>
+                                  </p:childTnLst>
+                                </p:cTn>
+                              </p:par>
+                            </p:childTnLst>
+                          </p:cTn>
+                        </p:par>
+                      </p:childTnLst>
+                    </p:cTn>
+                  </p:par>
+                </p:childTnLst>
+              </p:cTn>
+              <p:prevCondLst>
+                <p:cond evt="onPrev" delay="0">
+                  <p:tgtEl>
+                    <p:sldTgt/>
+                  </p:tgtEl>
+                </p:cond>
+              </p:prevCondLst>
+              <p:nextCondLst>
+                <p:cond evt="onNext" delay="0">
+                  <p:tgtEl>
+                    <p:sldTgt/>
+                  </p:tgtEl>
+                </p:cond>
+              </p:nextCondLst>
+            </p:seq>
+          </p:childTnLst>
+        </p:cTn>
+      </p:par>
+    </p:tnLst>
+  </p:timing>
 </p:sld>
 </file>
 
@@ -7772,7 +9708,7 @@
         </p:blipFill>
         <p:spPr>
           <a:xfrm>
-            <a:off x="769204" y="1186637"/>
+            <a:off x="769204" y="3954253"/>
             <a:ext cx="10131425" cy="2541681"/>
           </a:xfrm>
         </p:spPr>
@@ -7799,7 +9735,7 @@
         </p:blipFill>
         <p:spPr>
           <a:xfrm>
-            <a:off x="769204" y="3892441"/>
+            <a:off x="769204" y="1298455"/>
             <a:ext cx="10058400" cy="2534400"/>
           </a:xfrm>
           <a:prstGeom prst="rect">
@@ -7807,6 +9743,211 @@
           </a:prstGeom>
         </p:spPr>
       </p:pic>
+      <p:sp>
+        <p:nvSpPr>
+          <p:cNvPr id="5" name="Rectangle 4"/>
+          <p:cNvSpPr/>
+          <p:nvPr/>
+        </p:nvSpPr>
+        <p:spPr>
+          <a:xfrm rot="16200000">
+            <a:off x="-850502" y="4991369"/>
+            <a:ext cx="2470212" cy="395979"/>
+          </a:xfrm>
+          <a:prstGeom prst="rect">
+            <a:avLst/>
+          </a:prstGeom>
+        </p:spPr>
+        <p:style>
+          <a:lnRef idx="2">
+            <a:schemeClr val="accent1">
+              <a:shade val="50000"/>
+            </a:schemeClr>
+          </a:lnRef>
+          <a:fillRef idx="1">
+            <a:schemeClr val="accent1"/>
+          </a:fillRef>
+          <a:effectRef idx="0">
+            <a:schemeClr val="accent1"/>
+          </a:effectRef>
+          <a:fontRef idx="minor">
+            <a:schemeClr val="lt1"/>
+          </a:fontRef>
+        </p:style>
+        <p:txBody>
+          <a:bodyPr rtlCol="0" anchor="ctr"/>
+          <a:lstStyle/>
+          <a:p>
+            <a:pPr algn="ctr"/>
+            <a:r>
+              <a:rPr lang="en-US" dirty="0" smtClean="0"/>
+              <a:t> (Features)</a:t>
+            </a:r>
+            <a:endParaRPr lang="en-US" dirty="0"/>
+          </a:p>
+        </p:txBody>
+      </p:sp>
+      <p:sp>
+        <p:nvSpPr>
+          <p:cNvPr id="8" name="Rectangle 7"/>
+          <p:cNvSpPr/>
+          <p:nvPr/>
+        </p:nvSpPr>
+        <p:spPr>
+          <a:xfrm rot="16200000">
+            <a:off x="-882597" y="2367664"/>
+            <a:ext cx="2534400" cy="395979"/>
+          </a:xfrm>
+          <a:prstGeom prst="rect">
+            <a:avLst/>
+          </a:prstGeom>
+          <a:solidFill>
+            <a:schemeClr val="accent3"/>
+          </a:solidFill>
+        </p:spPr>
+        <p:style>
+          <a:lnRef idx="2">
+            <a:schemeClr val="accent1">
+              <a:shade val="50000"/>
+            </a:schemeClr>
+          </a:lnRef>
+          <a:fillRef idx="1">
+            <a:schemeClr val="accent1"/>
+          </a:fillRef>
+          <a:effectRef idx="0">
+            <a:schemeClr val="accent1"/>
+          </a:effectRef>
+          <a:fontRef idx="minor">
+            <a:schemeClr val="lt1"/>
+          </a:fontRef>
+        </p:style>
+        <p:txBody>
+          <a:bodyPr rtlCol="0" anchor="ctr"/>
+          <a:lstStyle/>
+          <a:p>
+            <a:pPr algn="ctr"/>
+            <a:r>
+              <a:rPr lang="en-US" dirty="0" smtClean="0"/>
+              <a:t>(Response)</a:t>
+            </a:r>
+            <a:endParaRPr lang="en-US" dirty="0"/>
+          </a:p>
+        </p:txBody>
+      </p:sp>
+      <p:sp>
+        <p:nvSpPr>
+          <p:cNvPr id="9" name="Title 1"/>
+          <p:cNvSpPr txBox="1">
+            <a:spLocks/>
+          </p:cNvSpPr>
+          <p:nvPr/>
+        </p:nvSpPr>
+        <p:spPr>
+          <a:xfrm>
+            <a:off x="0" y="-93785"/>
+            <a:ext cx="10131425" cy="1456267"/>
+          </a:xfrm>
+          <a:prstGeom prst="rect">
+            <a:avLst/>
+          </a:prstGeom>
+          <a:effectLst/>
+        </p:spPr>
+        <p:txBody>
+          <a:bodyPr vert="horz" lIns="91440" tIns="45720" rIns="91440" bIns="45720" rtlCol="0" anchor="ctr">
+            <a:normAutofit/>
+          </a:bodyPr>
+          <a:lstStyle>
+            <a:lvl1pPr algn="l" defTabSz="457200" rtl="0" eaLnBrk="1" latinLnBrk="0" hangingPunct="1">
+              <a:spcBef>
+                <a:spcPct val="0"/>
+              </a:spcBef>
+              <a:buNone/>
+              <a:defRPr sz="3600" kern="1200" cap="all">
+                <a:ln w="3175" cmpd="sng">
+                  <a:noFill/>
+                </a:ln>
+                <a:solidFill>
+                  <a:schemeClr val="tx1"/>
+                </a:solidFill>
+                <a:effectLst/>
+                <a:latin typeface="+mj-lt"/>
+                <a:ea typeface="+mj-ea"/>
+                <a:cs typeface="+mj-cs"/>
+              </a:defRPr>
+            </a:lvl1pPr>
+            <a:lvl2pPr eaLnBrk="1" hangingPunct="1">
+              <a:defRPr>
+                <a:solidFill>
+                  <a:schemeClr val="tx2"/>
+                </a:solidFill>
+              </a:defRPr>
+            </a:lvl2pPr>
+            <a:lvl3pPr eaLnBrk="1" hangingPunct="1">
+              <a:defRPr>
+                <a:solidFill>
+                  <a:schemeClr val="tx2"/>
+                </a:solidFill>
+              </a:defRPr>
+            </a:lvl3pPr>
+            <a:lvl4pPr eaLnBrk="1" hangingPunct="1">
+              <a:defRPr>
+                <a:solidFill>
+                  <a:schemeClr val="tx2"/>
+                </a:solidFill>
+              </a:defRPr>
+            </a:lvl4pPr>
+            <a:lvl5pPr eaLnBrk="1" hangingPunct="1">
+              <a:defRPr>
+                <a:solidFill>
+                  <a:schemeClr val="tx2"/>
+                </a:solidFill>
+              </a:defRPr>
+            </a:lvl5pPr>
+            <a:lvl6pPr eaLnBrk="1" hangingPunct="1">
+              <a:defRPr>
+                <a:solidFill>
+                  <a:schemeClr val="tx2"/>
+                </a:solidFill>
+              </a:defRPr>
+            </a:lvl6pPr>
+            <a:lvl7pPr eaLnBrk="1" hangingPunct="1">
+              <a:defRPr>
+                <a:solidFill>
+                  <a:schemeClr val="tx2"/>
+                </a:solidFill>
+              </a:defRPr>
+            </a:lvl7pPr>
+            <a:lvl8pPr eaLnBrk="1" hangingPunct="1">
+              <a:defRPr>
+                <a:solidFill>
+                  <a:schemeClr val="tx2"/>
+                </a:solidFill>
+              </a:defRPr>
+            </a:lvl8pPr>
+            <a:lvl9pPr eaLnBrk="1" hangingPunct="1">
+              <a:defRPr>
+                <a:solidFill>
+                  <a:schemeClr val="tx2"/>
+                </a:solidFill>
+              </a:defRPr>
+            </a:lvl9pPr>
+          </a:lstStyle>
+          <a:p>
+            <a:r>
+              <a:rPr lang="en-US" dirty="0" smtClean="0"/>
+              <a:t>Data Exploration (“The bad and the ugly”)</a:t>
+            </a:r>
+            <a:br>
+              <a:rPr lang="en-US" dirty="0" smtClean="0"/>
+            </a:br>
+            <a:r>
+              <a:rPr lang="en-US" sz="2800" dirty="0" smtClean="0"/>
+              <a:t>DUBIOUS CORRELATION BETWEEN FEATURES AND RESPONSE</a:t>
+            </a:r>
+            <a:endParaRPr lang="en-US" dirty="0"/>
+          </a:p>
+        </p:txBody>
+      </p:sp>
     </p:spTree>
     <p:extLst>
       <p:ext uri="{BB962C8B-B14F-4D97-AF65-F5344CB8AC3E}">
@@ -7817,6 +9958,199 @@
   <p:clrMapOvr>
     <a:masterClrMapping/>
   </p:clrMapOvr>
+  <p:timing>
+    <p:tnLst>
+      <p:par>
+        <p:cTn id="1" dur="indefinite" restart="never" nodeType="tmRoot">
+          <p:childTnLst>
+            <p:seq concurrent="1" nextAc="seek">
+              <p:cTn id="2" dur="indefinite" nodeType="mainSeq">
+                <p:childTnLst>
+                  <p:par>
+                    <p:cTn id="3" fill="hold">
+                      <p:stCondLst>
+                        <p:cond delay="indefinite"/>
+                      </p:stCondLst>
+                      <p:childTnLst>
+                        <p:par>
+                          <p:cTn id="4" fill="hold">
+                            <p:stCondLst>
+                              <p:cond delay="0"/>
+                            </p:stCondLst>
+                            <p:childTnLst>
+                              <p:par>
+                                <p:cTn id="5" presetID="10" presetClass="entr" presetSubtype="0" fill="hold" nodeType="clickEffect">
+                                  <p:stCondLst>
+                                    <p:cond delay="0"/>
+                                  </p:stCondLst>
+                                  <p:childTnLst>
+                                    <p:set>
+                                      <p:cBhvr>
+                                        <p:cTn id="6" dur="1" fill="hold">
+                                          <p:stCondLst>
+                                            <p:cond delay="0"/>
+                                          </p:stCondLst>
+                                        </p:cTn>
+                                        <p:tgtEl>
+                                          <p:spTgt spid="6"/>
+                                        </p:tgtEl>
+                                        <p:attrNameLst>
+                                          <p:attrName>style.visibility</p:attrName>
+                                        </p:attrNameLst>
+                                      </p:cBhvr>
+                                      <p:to>
+                                        <p:strVal val="visible"/>
+                                      </p:to>
+                                    </p:set>
+                                    <p:animEffect transition="in" filter="fade">
+                                      <p:cBhvr>
+                                        <p:cTn id="7" dur="500"/>
+                                        <p:tgtEl>
+                                          <p:spTgt spid="6"/>
+                                        </p:tgtEl>
+                                      </p:cBhvr>
+                                    </p:animEffect>
+                                  </p:childTnLst>
+                                </p:cTn>
+                              </p:par>
+                              <p:par>
+                                <p:cTn id="8" presetID="10" presetClass="entr" presetSubtype="0" fill="hold" grpId="0" nodeType="withEffect">
+                                  <p:stCondLst>
+                                    <p:cond delay="0"/>
+                                  </p:stCondLst>
+                                  <p:childTnLst>
+                                    <p:set>
+                                      <p:cBhvr>
+                                        <p:cTn id="9" dur="1" fill="hold">
+                                          <p:stCondLst>
+                                            <p:cond delay="0"/>
+                                          </p:stCondLst>
+                                        </p:cTn>
+                                        <p:tgtEl>
+                                          <p:spTgt spid="5"/>
+                                        </p:tgtEl>
+                                        <p:attrNameLst>
+                                          <p:attrName>style.visibility</p:attrName>
+                                        </p:attrNameLst>
+                                      </p:cBhvr>
+                                      <p:to>
+                                        <p:strVal val="visible"/>
+                                      </p:to>
+                                    </p:set>
+                                    <p:animEffect transition="in" filter="fade">
+                                      <p:cBhvr>
+                                        <p:cTn id="10" dur="500"/>
+                                        <p:tgtEl>
+                                          <p:spTgt spid="5"/>
+                                        </p:tgtEl>
+                                      </p:cBhvr>
+                                    </p:animEffect>
+                                  </p:childTnLst>
+                                </p:cTn>
+                              </p:par>
+                              <p:par>
+                                <p:cTn id="11" presetID="10" presetClass="entr" presetSubtype="0" fill="hold" grpId="0" nodeType="withEffect">
+                                  <p:stCondLst>
+                                    <p:cond delay="0"/>
+                                  </p:stCondLst>
+                                  <p:childTnLst>
+                                    <p:set>
+                                      <p:cBhvr>
+                                        <p:cTn id="12" dur="1" fill="hold">
+                                          <p:stCondLst>
+                                            <p:cond delay="0"/>
+                                          </p:stCondLst>
+                                        </p:cTn>
+                                        <p:tgtEl>
+                                          <p:spTgt spid="9"/>
+                                        </p:tgtEl>
+                                        <p:attrNameLst>
+                                          <p:attrName>style.visibility</p:attrName>
+                                        </p:attrNameLst>
+                                      </p:cBhvr>
+                                      <p:to>
+                                        <p:strVal val="visible"/>
+                                      </p:to>
+                                    </p:set>
+                                    <p:animEffect transition="in" filter="fade">
+                                      <p:cBhvr>
+                                        <p:cTn id="13" dur="500"/>
+                                        <p:tgtEl>
+                                          <p:spTgt spid="9"/>
+                                        </p:tgtEl>
+                                      </p:cBhvr>
+                                    </p:animEffect>
+                                  </p:childTnLst>
+                                </p:cTn>
+                              </p:par>
+                              <p:par>
+                                <p:cTn id="14" presetID="10" presetClass="exit" presetSubtype="0" fill="hold" grpId="0" nodeType="withEffect">
+                                  <p:stCondLst>
+                                    <p:cond delay="0"/>
+                                  </p:stCondLst>
+                                  <p:childTnLst>
+                                    <p:animEffect transition="out" filter="fade">
+                                      <p:cBhvr>
+                                        <p:cTn id="15" dur="500"/>
+                                        <p:tgtEl>
+                                          <p:spTgt spid="2"/>
+                                        </p:tgtEl>
+                                      </p:cBhvr>
+                                    </p:animEffect>
+                                    <p:set>
+                                      <p:cBhvr>
+                                        <p:cTn id="16" dur="1" fill="hold">
+                                          <p:stCondLst>
+                                            <p:cond delay="499"/>
+                                          </p:stCondLst>
+                                        </p:cTn>
+                                        <p:tgtEl>
+                                          <p:spTgt spid="2"/>
+                                        </p:tgtEl>
+                                        <p:attrNameLst>
+                                          <p:attrName>style.visibility</p:attrName>
+                                        </p:attrNameLst>
+                                      </p:cBhvr>
+                                      <p:to>
+                                        <p:strVal val="hidden"/>
+                                      </p:to>
+                                    </p:set>
+                                  </p:childTnLst>
+                                </p:cTn>
+                              </p:par>
+                            </p:childTnLst>
+                          </p:cTn>
+                        </p:par>
+                      </p:childTnLst>
+                    </p:cTn>
+                  </p:par>
+                </p:childTnLst>
+              </p:cTn>
+              <p:prevCondLst>
+                <p:cond evt="onPrev" delay="0">
+                  <p:tgtEl>
+                    <p:sldTgt/>
+                  </p:tgtEl>
+                </p:cond>
+              </p:prevCondLst>
+              <p:nextCondLst>
+                <p:cond evt="onNext" delay="0">
+                  <p:tgtEl>
+                    <p:sldTgt/>
+                  </p:tgtEl>
+                </p:cond>
+              </p:nextCondLst>
+            </p:seq>
+          </p:childTnLst>
+        </p:cTn>
+      </p:par>
+    </p:tnLst>
+    <p:bldLst>
+      <p:bldP spid="2" grpId="0"/>
+      <p:bldP spid="5" grpId="0" animBg="1"/>
+      <p:bldP spid="9" grpId="0"/>
+    </p:bldLst>
+  </p:timing>
 </p:sld>
 </file>
 
@@ -7901,6 +10235,62 @@
           </a:xfrm>
         </p:spPr>
       </p:pic>
+      <p:sp>
+        <p:nvSpPr>
+          <p:cNvPr id="3" name="TextBox 2"/>
+          <p:cNvSpPr txBox="1"/>
+          <p:nvPr/>
+        </p:nvSpPr>
+        <p:spPr>
+          <a:xfrm>
+            <a:off x="2105891" y="5874327"/>
+            <a:ext cx="7689272" cy="830997"/>
+          </a:xfrm>
+          <a:prstGeom prst="rect">
+            <a:avLst/>
+          </a:prstGeom>
+          <a:noFill/>
+        </p:spPr>
+        <p:txBody>
+          <a:bodyPr wrap="square" rtlCol="0">
+            <a:spAutoFit/>
+          </a:bodyPr>
+          <a:lstStyle/>
+          <a:p>
+            <a:r>
+              <a:rPr lang="en-US" sz="2400" dirty="0" smtClean="0"/>
+              <a:t>RMSE = </a:t>
+            </a:r>
+            <a:r>
+              <a:rPr lang="en-US" sz="2400" dirty="0" smtClean="0">
+                <a:solidFill>
+                  <a:srgbClr val="FF0000"/>
+                </a:solidFill>
+              </a:rPr>
+              <a:t>11.4</a:t>
+            </a:r>
+          </a:p>
+          <a:p>
+            <a:r>
+              <a:rPr lang="en-US" sz="2400" dirty="0" smtClean="0"/>
+              <a:t>RMSE (NULL) = </a:t>
+            </a:r>
+            <a:r>
+              <a:rPr lang="en-US" sz="2400" dirty="0" smtClean="0">
+                <a:solidFill>
+                  <a:srgbClr val="FF0000"/>
+                </a:solidFill>
+              </a:rPr>
+              <a:t>8.5</a:t>
+            </a:r>
+            <a:endParaRPr lang="en-US" sz="2400" dirty="0">
+              <a:solidFill>
+                <a:srgbClr val="FF0000"/>
+              </a:solidFill>
+            </a:endParaRPr>
+          </a:p>
+        </p:txBody>
+      </p:sp>
     </p:spTree>
     <p:extLst>
       <p:ext uri="{BB962C8B-B14F-4D97-AF65-F5344CB8AC3E}">
@@ -7911,6 +10301,92 @@
   <p:clrMapOvr>
     <a:masterClrMapping/>
   </p:clrMapOvr>
+  <p:timing>
+    <p:tnLst>
+      <p:par>
+        <p:cTn id="1" dur="indefinite" restart="never" nodeType="tmRoot">
+          <p:childTnLst>
+            <p:seq concurrent="1" nextAc="seek">
+              <p:cTn id="2" dur="indefinite" nodeType="mainSeq">
+                <p:childTnLst>
+                  <p:par>
+                    <p:cTn id="3" fill="hold">
+                      <p:stCondLst>
+                        <p:cond delay="indefinite"/>
+                      </p:stCondLst>
+                      <p:childTnLst>
+                        <p:par>
+                          <p:cTn id="4" fill="hold">
+                            <p:stCondLst>
+                              <p:cond delay="0"/>
+                            </p:stCondLst>
+                            <p:childTnLst>
+                              <p:par>
+                                <p:cTn id="5" presetID="10" presetClass="entr" presetSubtype="0" fill="hold" grpId="0" nodeType="clickEffect">
+                                  <p:stCondLst>
+                                    <p:cond delay="0"/>
+                                  </p:stCondLst>
+                                  <p:childTnLst>
+                                    <p:set>
+                                      <p:cBhvr>
+                                        <p:cTn id="6" dur="1" fill="hold">
+                                          <p:stCondLst>
+                                            <p:cond delay="0"/>
+                                          </p:stCondLst>
+                                        </p:cTn>
+                                        <p:tgtEl>
+                                          <p:spTgt spid="3"/>
+                                        </p:tgtEl>
+                                        <p:attrNameLst>
+                                          <p:attrName>style.visibility</p:attrName>
+                                        </p:attrNameLst>
+                                      </p:cBhvr>
+                                      <p:to>
+                                        <p:strVal val="visible"/>
+                                      </p:to>
+                                    </p:set>
+                                    <p:animEffect transition="in" filter="fade">
+                                      <p:cBhvr>
+                                        <p:cTn id="7" dur="500"/>
+                                        <p:tgtEl>
+                                          <p:spTgt spid="3"/>
+                                        </p:tgtEl>
+                                      </p:cBhvr>
+                                    </p:animEffect>
+                                  </p:childTnLst>
+                                </p:cTn>
+                              </p:par>
+                            </p:childTnLst>
+                          </p:cTn>
+                        </p:par>
+                      </p:childTnLst>
+                    </p:cTn>
+                  </p:par>
+                </p:childTnLst>
+              </p:cTn>
+              <p:prevCondLst>
+                <p:cond evt="onPrev" delay="0">
+                  <p:tgtEl>
+                    <p:sldTgt/>
+                  </p:tgtEl>
+                </p:cond>
+              </p:prevCondLst>
+              <p:nextCondLst>
+                <p:cond evt="onNext" delay="0">
+                  <p:tgtEl>
+                    <p:sldTgt/>
+                  </p:tgtEl>
+                </p:cond>
+              </p:nextCondLst>
+            </p:seq>
+          </p:childTnLst>
+        </p:cTn>
+      </p:par>
+    </p:tnLst>
+    <p:bldLst>
+      <p:bldP spid="3" grpId="0"/>
+    </p:bldLst>
+  </p:timing>
 </p:sld>
 </file>
 
@@ -7997,6 +10473,54 @@
           </a:xfrm>
         </p:spPr>
       </p:pic>
+      <p:sp>
+        <p:nvSpPr>
+          <p:cNvPr id="6" name="TextBox 5"/>
+          <p:cNvSpPr txBox="1"/>
+          <p:nvPr/>
+        </p:nvSpPr>
+        <p:spPr>
+          <a:xfrm>
+            <a:off x="5190402" y="2410690"/>
+            <a:ext cx="2055524" cy="646331"/>
+          </a:xfrm>
+          <a:prstGeom prst="rect">
+            <a:avLst/>
+          </a:prstGeom>
+          <a:noFill/>
+        </p:spPr>
+        <p:txBody>
+          <a:bodyPr wrap="square" rtlCol="0">
+            <a:spAutoFit/>
+          </a:bodyPr>
+          <a:lstStyle/>
+          <a:p>
+            <a:r>
+              <a:rPr lang="en-US" dirty="0" smtClean="0">
+                <a:solidFill>
+                  <a:srgbClr val="FF0000"/>
+                </a:solidFill>
+              </a:rPr>
+              <a:t>True Positive 80%</a:t>
+            </a:r>
+          </a:p>
+          <a:p>
+            <a:r>
+              <a:rPr lang="en-US" dirty="0" smtClean="0">
+                <a:solidFill>
+                  <a:srgbClr val="FF0000"/>
+                </a:solidFill>
+              </a:rPr>
+              <a:t>False Positive 40%</a:t>
+            </a:r>
+            <a:endParaRPr lang="en-US" dirty="0">
+              <a:solidFill>
+                <a:srgbClr val="FF0000"/>
+              </a:solidFill>
+            </a:endParaRPr>
+          </a:p>
+        </p:txBody>
+      </p:sp>
     </p:spTree>
     <p:extLst>
       <p:ext uri="{BB962C8B-B14F-4D97-AF65-F5344CB8AC3E}">
@@ -8007,6 +10531,92 @@
   <p:clrMapOvr>
     <a:masterClrMapping/>
   </p:clrMapOvr>
+  <p:timing>
+    <p:tnLst>
+      <p:par>
+        <p:cTn id="1" dur="indefinite" restart="never" nodeType="tmRoot">
+          <p:childTnLst>
+            <p:seq concurrent="1" nextAc="seek">
+              <p:cTn id="2" dur="indefinite" nodeType="mainSeq">
+                <p:childTnLst>
+                  <p:par>
+                    <p:cTn id="3" fill="hold">
+                      <p:stCondLst>
+                        <p:cond delay="indefinite"/>
+                      </p:stCondLst>
+                      <p:childTnLst>
+                        <p:par>
+                          <p:cTn id="4" fill="hold">
+                            <p:stCondLst>
+                              <p:cond delay="0"/>
+                            </p:stCondLst>
+                            <p:childTnLst>
+                              <p:par>
+                                <p:cTn id="5" presetID="10" presetClass="entr" presetSubtype="0" fill="hold" grpId="0" nodeType="clickEffect">
+                                  <p:stCondLst>
+                                    <p:cond delay="0"/>
+                                  </p:stCondLst>
+                                  <p:childTnLst>
+                                    <p:set>
+                                      <p:cBhvr>
+                                        <p:cTn id="6" dur="1" fill="hold">
+                                          <p:stCondLst>
+                                            <p:cond delay="0"/>
+                                          </p:stCondLst>
+                                        </p:cTn>
+                                        <p:tgtEl>
+                                          <p:spTgt spid="6"/>
+                                        </p:tgtEl>
+                                        <p:attrNameLst>
+                                          <p:attrName>style.visibility</p:attrName>
+                                        </p:attrNameLst>
+                                      </p:cBhvr>
+                                      <p:to>
+                                        <p:strVal val="visible"/>
+                                      </p:to>
+                                    </p:set>
+                                    <p:animEffect transition="in" filter="fade">
+                                      <p:cBhvr>
+                                        <p:cTn id="7" dur="500"/>
+                                        <p:tgtEl>
+                                          <p:spTgt spid="6"/>
+                                        </p:tgtEl>
+                                      </p:cBhvr>
+                                    </p:animEffect>
+                                  </p:childTnLst>
+                                </p:cTn>
+                              </p:par>
+                            </p:childTnLst>
+                          </p:cTn>
+                        </p:par>
+                      </p:childTnLst>
+                    </p:cTn>
+                  </p:par>
+                </p:childTnLst>
+              </p:cTn>
+              <p:prevCondLst>
+                <p:cond evt="onPrev" delay="0">
+                  <p:tgtEl>
+                    <p:sldTgt/>
+                  </p:tgtEl>
+                </p:cond>
+              </p:prevCondLst>
+              <p:nextCondLst>
+                <p:cond evt="onNext" delay="0">
+                  <p:tgtEl>
+                    <p:sldTgt/>
+                  </p:tgtEl>
+                </p:cond>
+              </p:nextCondLst>
+            </p:seq>
+          </p:childTnLst>
+        </p:cTn>
+      </p:par>
+    </p:tnLst>
+    <p:bldLst>
+      <p:bldP spid="6" grpId="0"/>
+    </p:bldLst>
+  </p:timing>
 </p:sld>
 </file>
 
@@ -8185,6 +10795,128 @@
   <p:clrMapOvr>
     <a:masterClrMapping/>
   </p:clrMapOvr>
+  <p:timing>
+    <p:tnLst>
+      <p:par>
+        <p:cTn id="1" dur="indefinite" restart="never" nodeType="tmRoot">
+          <p:childTnLst>
+            <p:seq concurrent="1" nextAc="seek">
+              <p:cTn id="2" dur="indefinite" nodeType="mainSeq">
+                <p:childTnLst>
+                  <p:par>
+                    <p:cTn id="3" fill="hold">
+                      <p:stCondLst>
+                        <p:cond delay="indefinite"/>
+                      </p:stCondLst>
+                      <p:childTnLst>
+                        <p:par>
+                          <p:cTn id="4" fill="hold">
+                            <p:stCondLst>
+                              <p:cond delay="0"/>
+                            </p:stCondLst>
+                            <p:childTnLst>
+                              <p:par>
+                                <p:cTn id="5" presetID="10" presetClass="entr" presetSubtype="0" fill="hold" grpId="0" nodeType="clickEffect">
+                                  <p:stCondLst>
+                                    <p:cond delay="0"/>
+                                  </p:stCondLst>
+                                  <p:childTnLst>
+                                    <p:set>
+                                      <p:cBhvr>
+                                        <p:cTn id="6" dur="1" fill="hold">
+                                          <p:stCondLst>
+                                            <p:cond delay="0"/>
+                                          </p:stCondLst>
+                                        </p:cTn>
+                                        <p:tgtEl>
+                                          <p:spTgt spid="8"/>
+                                        </p:tgtEl>
+                                        <p:attrNameLst>
+                                          <p:attrName>style.visibility</p:attrName>
+                                        </p:attrNameLst>
+                                      </p:cBhvr>
+                                      <p:to>
+                                        <p:strVal val="visible"/>
+                                      </p:to>
+                                    </p:set>
+                                    <p:animEffect transition="in" filter="fade">
+                                      <p:cBhvr>
+                                        <p:cTn id="7" dur="500"/>
+                                        <p:tgtEl>
+                                          <p:spTgt spid="8"/>
+                                        </p:tgtEl>
+                                      </p:cBhvr>
+                                    </p:animEffect>
+                                  </p:childTnLst>
+                                </p:cTn>
+                              </p:par>
+                              <p:par>
+                                <p:cTn id="8" presetID="10" presetClass="entr" presetSubtype="0" fill="hold" grpId="0" nodeType="withEffect">
+                                  <p:stCondLst>
+                                    <p:cond delay="0"/>
+                                  </p:stCondLst>
+                                  <p:childTnLst>
+                                    <p:set>
+                                      <p:cBhvr>
+                                        <p:cTn id="9" dur="1" fill="hold">
+                                          <p:stCondLst>
+                                            <p:cond delay="0"/>
+                                          </p:stCondLst>
+                                        </p:cTn>
+                                        <p:tgtEl>
+                                          <p:spTgt spid="5"/>
+                                        </p:tgtEl>
+                                        <p:attrNameLst>
+                                          <p:attrName>style.visibility</p:attrName>
+                                        </p:attrNameLst>
+                                      </p:cBhvr>
+                                      <p:to>
+                                        <p:strVal val="visible"/>
+                                      </p:to>
+                                    </p:set>
+                                    <p:animEffect transition="in" filter="fade">
+                                      <p:cBhvr>
+                                        <p:cTn id="10" dur="500"/>
+                                        <p:tgtEl>
+                                          <p:spTgt spid="5"/>
+                                        </p:tgtEl>
+                                      </p:cBhvr>
+                                    </p:animEffect>
+                                  </p:childTnLst>
+                                </p:cTn>
+                              </p:par>
+                            </p:childTnLst>
+                          </p:cTn>
+                        </p:par>
+                      </p:childTnLst>
+                    </p:cTn>
+                  </p:par>
+                </p:childTnLst>
+              </p:cTn>
+              <p:prevCondLst>
+                <p:cond evt="onPrev" delay="0">
+                  <p:tgtEl>
+                    <p:sldTgt/>
+                  </p:tgtEl>
+                </p:cond>
+              </p:prevCondLst>
+              <p:nextCondLst>
+                <p:cond evt="onNext" delay="0">
+                  <p:tgtEl>
+                    <p:sldTgt/>
+                  </p:tgtEl>
+                </p:cond>
+              </p:nextCondLst>
+            </p:seq>
+          </p:childTnLst>
+        </p:cTn>
+      </p:par>
+    </p:tnLst>
+    <p:bldLst>
+      <p:bldP spid="5" grpId="0" animBg="1"/>
+      <p:bldP spid="8" grpId="0" animBg="1"/>
+    </p:bldLst>
+  </p:timing>
 </p:sld>
 </file>
 
@@ -8222,7 +10954,7 @@
           <a:p>
             <a:r>
               <a:rPr lang="en-US" dirty="0" smtClean="0"/>
-              <a:t>Summary</a:t>
+              <a:t>Summary AND NEXT STEPS</a:t>
             </a:r>
             <a:endParaRPr lang="en-US" dirty="0"/>
           </a:p>
@@ -8238,7 +10970,12 @@
             <p:ph idx="1"/>
           </p:nvPr>
         </p:nvSpPr>
-        <p:spPr/>
+        <p:spPr>
+          <a:xfrm>
+            <a:off x="685801" y="1898073"/>
+            <a:ext cx="10131425" cy="2452255"/>
+          </a:xfrm>
+        </p:spPr>
         <p:txBody>
           <a:bodyPr>
             <a:normAutofit/>
@@ -8279,6 +11016,222 @@
   <p:clrMapOvr>
     <a:masterClrMapping/>
   </p:clrMapOvr>
+  <p:timing>
+    <p:tnLst>
+      <p:par>
+        <p:cTn id="1" dur="indefinite" restart="never" nodeType="tmRoot">
+          <p:childTnLst>
+            <p:seq concurrent="1" nextAc="seek">
+              <p:cTn id="2" dur="indefinite" nodeType="mainSeq">
+                <p:childTnLst>
+                  <p:par>
+                    <p:cTn id="3" fill="hold">
+                      <p:stCondLst>
+                        <p:cond delay="indefinite"/>
+                      </p:stCondLst>
+                      <p:childTnLst>
+                        <p:par>
+                          <p:cTn id="4" fill="hold">
+                            <p:stCondLst>
+                              <p:cond delay="0"/>
+                            </p:stCondLst>
+                            <p:childTnLst>
+                              <p:par>
+                                <p:cTn id="5" presetID="10" presetClass="entr" presetSubtype="0" fill="hold" grpId="0" nodeType="clickEffect">
+                                  <p:stCondLst>
+                                    <p:cond delay="0"/>
+                                  </p:stCondLst>
+                                  <p:childTnLst>
+                                    <p:set>
+                                      <p:cBhvr>
+                                        <p:cTn id="6" dur="1" fill="hold">
+                                          <p:stCondLst>
+                                            <p:cond delay="0"/>
+                                          </p:stCondLst>
+                                        </p:cTn>
+                                        <p:tgtEl>
+                                          <p:spTgt spid="3">
+                                            <p:txEl>
+                                              <p:pRg st="0" end="0"/>
+                                            </p:txEl>
+                                          </p:spTgt>
+                                        </p:tgtEl>
+                                        <p:attrNameLst>
+                                          <p:attrName>style.visibility</p:attrName>
+                                        </p:attrNameLst>
+                                      </p:cBhvr>
+                                      <p:to>
+                                        <p:strVal val="visible"/>
+                                      </p:to>
+                                    </p:set>
+                                    <p:animEffect transition="in" filter="fade">
+                                      <p:cBhvr>
+                                        <p:cTn id="7" dur="500"/>
+                                        <p:tgtEl>
+                                          <p:spTgt spid="3">
+                                            <p:txEl>
+                                              <p:pRg st="0" end="0"/>
+                                            </p:txEl>
+                                          </p:spTgt>
+                                        </p:tgtEl>
+                                      </p:cBhvr>
+                                    </p:animEffect>
+                                  </p:childTnLst>
+                                </p:cTn>
+                              </p:par>
+                            </p:childTnLst>
+                          </p:cTn>
+                        </p:par>
+                      </p:childTnLst>
+                    </p:cTn>
+                  </p:par>
+                  <p:par>
+                    <p:cTn id="8" fill="hold">
+                      <p:stCondLst>
+                        <p:cond delay="indefinite"/>
+                      </p:stCondLst>
+                      <p:childTnLst>
+                        <p:par>
+                          <p:cTn id="9" fill="hold">
+                            <p:stCondLst>
+                              <p:cond delay="0"/>
+                            </p:stCondLst>
+                            <p:childTnLst>
+                              <p:par>
+                                <p:cTn id="10" presetID="10" presetClass="entr" presetSubtype="0" fill="hold" grpId="0" nodeType="clickEffect">
+                                  <p:stCondLst>
+                                    <p:cond delay="0"/>
+                                  </p:stCondLst>
+                                  <p:childTnLst>
+                                    <p:set>
+                                      <p:cBhvr>
+                                        <p:cTn id="11" dur="1" fill="hold">
+                                          <p:stCondLst>
+                                            <p:cond delay="0"/>
+                                          </p:stCondLst>
+                                        </p:cTn>
+                                        <p:tgtEl>
+                                          <p:spTgt spid="3">
+                                            <p:txEl>
+                                              <p:pRg st="1" end="1"/>
+                                            </p:txEl>
+                                          </p:spTgt>
+                                        </p:tgtEl>
+                                        <p:attrNameLst>
+                                          <p:attrName>style.visibility</p:attrName>
+                                        </p:attrNameLst>
+                                      </p:cBhvr>
+                                      <p:to>
+                                        <p:strVal val="visible"/>
+                                      </p:to>
+                                    </p:set>
+                                    <p:animEffect transition="in" filter="fade">
+                                      <p:cBhvr>
+                                        <p:cTn id="12" dur="500"/>
+                                        <p:tgtEl>
+                                          <p:spTgt spid="3">
+                                            <p:txEl>
+                                              <p:pRg st="1" end="1"/>
+                                            </p:txEl>
+                                          </p:spTgt>
+                                        </p:tgtEl>
+                                      </p:cBhvr>
+                                    </p:animEffect>
+                                  </p:childTnLst>
+                                </p:cTn>
+                              </p:par>
+                            </p:childTnLst>
+                          </p:cTn>
+                        </p:par>
+                      </p:childTnLst>
+                    </p:cTn>
+                  </p:par>
+                  <p:par>
+                    <p:cTn id="13" fill="hold">
+                      <p:stCondLst>
+                        <p:cond delay="indefinite"/>
+                      </p:stCondLst>
+                      <p:childTnLst>
+                        <p:par>
+                          <p:cTn id="14" fill="hold">
+                            <p:stCondLst>
+                              <p:cond delay="0"/>
+                            </p:stCondLst>
+                            <p:childTnLst>
+                              <p:par>
+                                <p:cTn id="15" presetID="10" presetClass="entr" presetSubtype="0" fill="hold" grpId="0" nodeType="clickEffect">
+                                  <p:stCondLst>
+                                    <p:cond delay="0"/>
+                                  </p:stCondLst>
+                                  <p:childTnLst>
+                                    <p:set>
+                                      <p:cBhvr>
+                                        <p:cTn id="16" dur="1" fill="hold">
+                                          <p:stCondLst>
+                                            <p:cond delay="0"/>
+                                          </p:stCondLst>
+                                        </p:cTn>
+                                        <p:tgtEl>
+                                          <p:spTgt spid="3">
+                                            <p:txEl>
+                                              <p:pRg st="2" end="2"/>
+                                            </p:txEl>
+                                          </p:spTgt>
+                                        </p:tgtEl>
+                                        <p:attrNameLst>
+                                          <p:attrName>style.visibility</p:attrName>
+                                        </p:attrNameLst>
+                                      </p:cBhvr>
+                                      <p:to>
+                                        <p:strVal val="visible"/>
+                                      </p:to>
+                                    </p:set>
+                                    <p:animEffect transition="in" filter="fade">
+                                      <p:cBhvr>
+                                        <p:cTn id="17" dur="500"/>
+                                        <p:tgtEl>
+                                          <p:spTgt spid="3">
+                                            <p:txEl>
+                                              <p:pRg st="2" end="2"/>
+                                            </p:txEl>
+                                          </p:spTgt>
+                                        </p:tgtEl>
+                                      </p:cBhvr>
+                                    </p:animEffect>
+                                  </p:childTnLst>
+                                </p:cTn>
+                              </p:par>
+                            </p:childTnLst>
+                          </p:cTn>
+                        </p:par>
+                      </p:childTnLst>
+                    </p:cTn>
+                  </p:par>
+                </p:childTnLst>
+              </p:cTn>
+              <p:prevCondLst>
+                <p:cond evt="onPrev" delay="0">
+                  <p:tgtEl>
+                    <p:sldTgt/>
+                  </p:tgtEl>
+                </p:cond>
+              </p:prevCondLst>
+              <p:nextCondLst>
+                <p:cond evt="onNext" delay="0">
+                  <p:tgtEl>
+                    <p:sldTgt/>
+                  </p:tgtEl>
+                </p:cond>
+              </p:nextCondLst>
+            </p:seq>
+          </p:childTnLst>
+        </p:cTn>
+      </p:par>
+    </p:tnLst>
+    <p:bldLst>
+      <p:bldP spid="3" grpId="0" build="p"/>
+    </p:bldLst>
+  </p:timing>
 </p:sld>
 </file>
 

</xml_diff>